<commit_message>
modifica attacco randomizzato + questionario
</commit_message>
<xml_diff>
--- a/Prensentazione_V2.pptx
+++ b/Prensentazione_V2.pptx
@@ -33,17 +33,16 @@
     <p:sldId id="270" r:id="rId27"/>
     <p:sldId id="277" r:id="rId28"/>
     <p:sldId id="278" r:id="rId29"/>
-    <p:sldId id="282" r:id="rId30"/>
-    <p:sldId id="279" r:id="rId31"/>
-    <p:sldId id="280" r:id="rId32"/>
-    <p:sldId id="281" r:id="rId33"/>
-    <p:sldId id="283" r:id="rId34"/>
-    <p:sldId id="284" r:id="rId35"/>
-    <p:sldId id="285" r:id="rId36"/>
-    <p:sldId id="286" r:id="rId37"/>
-    <p:sldId id="287" r:id="rId38"/>
-    <p:sldId id="295" r:id="rId39"/>
-    <p:sldId id="296" r:id="rId40"/>
+    <p:sldId id="279" r:id="rId30"/>
+    <p:sldId id="280" r:id="rId31"/>
+    <p:sldId id="281" r:id="rId32"/>
+    <p:sldId id="283" r:id="rId33"/>
+    <p:sldId id="284" r:id="rId34"/>
+    <p:sldId id="285" r:id="rId35"/>
+    <p:sldId id="286" r:id="rId36"/>
+    <p:sldId id="287" r:id="rId37"/>
+    <p:sldId id="295" r:id="rId38"/>
+    <p:sldId id="296" r:id="rId39"/>
   </p:sldIdLst>
   <p:sldSz cx="12192000" cy="6858000"/>
   <p:notesSz cx="6858000" cy="9144000"/>
@@ -10939,7 +10938,7 @@
           <a:p>
             <a:fld id="{6ECE92D5-F293-4B0E-AC01-9B7A0517D9F6}" type="datetimeFigureOut">
               <a:rPr lang="it-IT" smtClean="0"/>
-              <a:t>03/01/2022</a:t>
+              <a:t>04/01/2022</a:t>
             </a:fld>
             <a:endParaRPr lang="it-IT"/>
           </a:p>
@@ -11147,7 +11146,7 @@
           <a:p>
             <a:fld id="{6ECE92D5-F293-4B0E-AC01-9B7A0517D9F6}" type="datetimeFigureOut">
               <a:rPr lang="it-IT" smtClean="0"/>
-              <a:t>03/01/2022</a:t>
+              <a:t>04/01/2022</a:t>
             </a:fld>
             <a:endParaRPr lang="it-IT"/>
           </a:p>
@@ -11405,7 +11404,7 @@
           <a:p>
             <a:fld id="{6ECE92D5-F293-4B0E-AC01-9B7A0517D9F6}" type="datetimeFigureOut">
               <a:rPr lang="it-IT" smtClean="0"/>
-              <a:t>03/01/2022</a:t>
+              <a:t>04/01/2022</a:t>
             </a:fld>
             <a:endParaRPr lang="it-IT"/>
           </a:p>
@@ -11575,7 +11574,7 @@
           <a:p>
             <a:fld id="{6ECE92D5-F293-4B0E-AC01-9B7A0517D9F6}" type="datetimeFigureOut">
               <a:rPr lang="it-IT" smtClean="0"/>
-              <a:t>03/01/2022</a:t>
+              <a:t>04/01/2022</a:t>
             </a:fld>
             <a:endParaRPr lang="it-IT"/>
           </a:p>
@@ -11912,7 +11911,7 @@
           <a:p>
             <a:fld id="{6ECE92D5-F293-4B0E-AC01-9B7A0517D9F6}" type="datetimeFigureOut">
               <a:rPr lang="it-IT" smtClean="0"/>
-              <a:t>03/01/2022</a:t>
+              <a:t>04/01/2022</a:t>
             </a:fld>
             <a:endParaRPr lang="it-IT"/>
           </a:p>
@@ -12187,7 +12186,7 @@
           <a:p>
             <a:fld id="{6ECE92D5-F293-4B0E-AC01-9B7A0517D9F6}" type="datetimeFigureOut">
               <a:rPr lang="it-IT" smtClean="0"/>
-              <a:t>03/01/2022</a:t>
+              <a:t>04/01/2022</a:t>
             </a:fld>
             <a:endParaRPr lang="it-IT"/>
           </a:p>
@@ -12566,7 +12565,7 @@
           <a:p>
             <a:fld id="{6ECE92D5-F293-4B0E-AC01-9B7A0517D9F6}" type="datetimeFigureOut">
               <a:rPr lang="it-IT" smtClean="0"/>
-              <a:t>03/01/2022</a:t>
+              <a:t>04/01/2022</a:t>
             </a:fld>
             <a:endParaRPr lang="it-IT"/>
           </a:p>
@@ -12684,7 +12683,7 @@
           <a:p>
             <a:fld id="{6ECE92D5-F293-4B0E-AC01-9B7A0517D9F6}" type="datetimeFigureOut">
               <a:rPr lang="it-IT" smtClean="0"/>
-              <a:t>03/01/2022</a:t>
+              <a:t>04/01/2022</a:t>
             </a:fld>
             <a:endParaRPr lang="it-IT"/>
           </a:p>
@@ -12857,7 +12856,7 @@
           <a:p>
             <a:fld id="{6ECE92D5-F293-4B0E-AC01-9B7A0517D9F6}" type="datetimeFigureOut">
               <a:rPr lang="it-IT" smtClean="0"/>
-              <a:t>03/01/2022</a:t>
+              <a:t>04/01/2022</a:t>
             </a:fld>
             <a:endParaRPr lang="it-IT"/>
           </a:p>
@@ -13213,7 +13212,7 @@
           <a:p>
             <a:fld id="{6ECE92D5-F293-4B0E-AC01-9B7A0517D9F6}" type="datetimeFigureOut">
               <a:rPr lang="it-IT" smtClean="0"/>
-              <a:t>03/01/2022</a:t>
+              <a:t>04/01/2022</a:t>
             </a:fld>
             <a:endParaRPr lang="it-IT"/>
           </a:p>
@@ -13592,7 +13591,7 @@
           <a:p>
             <a:fld id="{6ECE92D5-F293-4B0E-AC01-9B7A0517D9F6}" type="datetimeFigureOut">
               <a:rPr lang="it-IT" smtClean="0"/>
-              <a:t>03/01/2022</a:t>
+              <a:t>04/01/2022</a:t>
             </a:fld>
             <a:endParaRPr lang="it-IT"/>
           </a:p>
@@ -13881,7 +13880,7 @@
           <a:p>
             <a:fld id="{6ECE92D5-F293-4B0E-AC01-9B7A0517D9F6}" type="datetimeFigureOut">
               <a:rPr lang="it-IT" smtClean="0"/>
-              <a:t>03/01/2022</a:t>
+              <a:t>04/01/2022</a:t>
             </a:fld>
             <a:endParaRPr lang="it-IT"/>
           </a:p>
@@ -19280,8 +19279,8 @@
           </a:p>
         </p:txBody>
       </p:sp>
-      <mc:AlternateContent xmlns:mc="http://schemas.openxmlformats.org/markup-compatibility/2006">
-        <mc:Choice xmlns:a14="http://schemas.microsoft.com/office/drawing/2010/main" Requires="a14">
+      <mc:AlternateContent xmlns:mc="http://schemas.openxmlformats.org/markup-compatibility/2006" xmlns:a14="http://schemas.microsoft.com/office/drawing/2010/main">
+        <mc:Choice Requires="a14">
           <p:sp>
             <p:nvSpPr>
               <p:cNvPr id="3" name="Segnaposto contenuto 2">
@@ -19426,7 +19425,7 @@
             </p:txBody>
           </p:sp>
         </mc:Choice>
-        <mc:Fallback>
+        <mc:Fallback xmlns="">
           <p:sp>
             <p:nvSpPr>
               <p:cNvPr id="3" name="Segnaposto contenuto 2">
@@ -19506,8 +19505,8 @@
           </a:prstGeom>
         </p:spPr>
       </p:pic>
-      <mc:AlternateContent xmlns:mc="http://schemas.openxmlformats.org/markup-compatibility/2006">
-        <mc:Choice xmlns:a14="http://schemas.microsoft.com/office/drawing/2010/main" Requires="a14">
+      <mc:AlternateContent xmlns:mc="http://schemas.openxmlformats.org/markup-compatibility/2006" xmlns:a14="http://schemas.microsoft.com/office/drawing/2010/main">
+        <mc:Choice Requires="a14">
           <p:sp>
             <p:nvSpPr>
               <p:cNvPr id="16" name="Segnaposto contenuto 2">
@@ -19831,7 +19830,7 @@
             </p:txBody>
           </p:sp>
         </mc:Choice>
-        <mc:Fallback>
+        <mc:Fallback xmlns="">
           <p:sp>
             <p:nvSpPr>
               <p:cNvPr id="16" name="Segnaposto contenuto 2">
@@ -20338,8 +20337,8 @@
           </a:prstGeom>
         </p:spPr>
       </p:pic>
-      <mc:AlternateContent xmlns:mc="http://schemas.openxmlformats.org/markup-compatibility/2006">
-        <mc:Choice xmlns:a14="http://schemas.microsoft.com/office/drawing/2010/main" Requires="a14">
+      <mc:AlternateContent xmlns:mc="http://schemas.openxmlformats.org/markup-compatibility/2006" xmlns:a14="http://schemas.microsoft.com/office/drawing/2010/main">
+        <mc:Choice Requires="a14">
           <p:sp>
             <p:nvSpPr>
               <p:cNvPr id="18" name="Segnaposto contenuto 2">
@@ -20753,7 +20752,7 @@
             </p:txBody>
           </p:sp>
         </mc:Choice>
-        <mc:Fallback>
+        <mc:Fallback xmlns="">
           <p:sp>
             <p:nvSpPr>
               <p:cNvPr id="18" name="Segnaposto contenuto 2">
@@ -22781,8 +22780,8 @@
           </a:p>
         </p:txBody>
       </p:sp>
-      <mc:AlternateContent xmlns:mc="http://schemas.openxmlformats.org/markup-compatibility/2006">
-        <mc:Choice xmlns:a14="http://schemas.microsoft.com/office/drawing/2010/main" Requires="a14">
+      <mc:AlternateContent xmlns:mc="http://schemas.openxmlformats.org/markup-compatibility/2006" xmlns:a14="http://schemas.microsoft.com/office/drawing/2010/main">
+        <mc:Choice Requires="a14">
           <p:sp>
             <p:nvSpPr>
               <p:cNvPr id="3" name="Segnaposto contenuto 2">
@@ -22918,7 +22917,7 @@
             </p:txBody>
           </p:sp>
         </mc:Choice>
-        <mc:Fallback>
+        <mc:Fallback xmlns="">
           <p:sp>
             <p:nvSpPr>
               <p:cNvPr id="3" name="Segnaposto contenuto 2">
@@ -23323,8 +23322,8 @@
           </a:prstGeom>
         </p:spPr>
       </p:pic>
-      <mc:AlternateContent xmlns:mc="http://schemas.openxmlformats.org/markup-compatibility/2006">
-        <mc:Choice xmlns:a14="http://schemas.microsoft.com/office/drawing/2010/main" Requires="a14">
+      <mc:AlternateContent xmlns:mc="http://schemas.openxmlformats.org/markup-compatibility/2006" xmlns:a14="http://schemas.microsoft.com/office/drawing/2010/main">
+        <mc:Choice Requires="a14">
           <p:sp>
             <p:nvSpPr>
               <p:cNvPr id="10" name="Segnaposto contenuto 2">
@@ -23648,7 +23647,7 @@
             </p:txBody>
           </p:sp>
         </mc:Choice>
-        <mc:Fallback>
+        <mc:Fallback xmlns="">
           <p:sp>
             <p:nvSpPr>
               <p:cNvPr id="10" name="Segnaposto contenuto 2">
@@ -24525,8 +24524,8 @@
           </a:p>
         </p:txBody>
       </p:sp>
-      <mc:AlternateContent xmlns:mc="http://schemas.openxmlformats.org/markup-compatibility/2006">
-        <mc:Choice xmlns:a14="http://schemas.microsoft.com/office/drawing/2010/main" Requires="a14">
+      <mc:AlternateContent xmlns:mc="http://schemas.openxmlformats.org/markup-compatibility/2006" xmlns:a14="http://schemas.microsoft.com/office/drawing/2010/main">
+        <mc:Choice Requires="a14">
           <p:sp>
             <p:nvSpPr>
               <p:cNvPr id="5" name="CasellaDiTesto 4">
@@ -24727,7 +24726,7 @@
             </p:txBody>
           </p:sp>
         </mc:Choice>
-        <mc:Fallback>
+        <mc:Fallback xmlns="">
           <p:sp>
             <p:nvSpPr>
               <p:cNvPr id="5" name="CasellaDiTesto 4">
@@ -24808,8 +24807,8 @@
           </a:prstGeom>
         </p:spPr>
       </p:pic>
-      <mc:AlternateContent xmlns:mc="http://schemas.openxmlformats.org/markup-compatibility/2006">
-        <mc:Choice xmlns:a14="http://schemas.microsoft.com/office/drawing/2010/main" Requires="a14">
+      <mc:AlternateContent xmlns:mc="http://schemas.openxmlformats.org/markup-compatibility/2006" xmlns:a14="http://schemas.microsoft.com/office/drawing/2010/main">
+        <mc:Choice Requires="a14">
           <p:sp>
             <p:nvSpPr>
               <p:cNvPr id="14" name="Segnaposto contenuto 2">
@@ -25118,7 +25117,7 @@
             </p:txBody>
           </p:sp>
         </mc:Choice>
-        <mc:Fallback>
+        <mc:Fallback xmlns="">
           <p:sp>
             <p:nvSpPr>
               <p:cNvPr id="14" name="Segnaposto contenuto 2">
@@ -26849,8 +26848,8 @@
           </a:p>
         </p:txBody>
       </p:sp>
-      <mc:AlternateContent xmlns:mc="http://schemas.openxmlformats.org/markup-compatibility/2006">
-        <mc:Choice xmlns:a14="http://schemas.microsoft.com/office/drawing/2010/main" Requires="a14">
+      <mc:AlternateContent xmlns:mc="http://schemas.openxmlformats.org/markup-compatibility/2006" xmlns:a14="http://schemas.microsoft.com/office/drawing/2010/main">
+        <mc:Choice Requires="a14">
           <p:sp>
             <p:nvSpPr>
               <p:cNvPr id="3" name="Segnaposto contenuto 2">
@@ -26989,7 +26988,7 @@
             </p:txBody>
           </p:sp>
         </mc:Choice>
-        <mc:Fallback>
+        <mc:Fallback xmlns="">
           <p:sp>
             <p:nvSpPr>
               <p:cNvPr id="3" name="Segnaposto contenuto 2">
@@ -27033,8 +27032,8 @@
           </p:sp>
         </mc:Fallback>
       </mc:AlternateContent>
-      <mc:AlternateContent xmlns:mc="http://schemas.openxmlformats.org/markup-compatibility/2006">
-        <mc:Choice xmlns:a14="http://schemas.microsoft.com/office/drawing/2010/main" Requires="a14">
+      <mc:AlternateContent xmlns:mc="http://schemas.openxmlformats.org/markup-compatibility/2006" xmlns:a14="http://schemas.microsoft.com/office/drawing/2010/main">
+        <mc:Choice Requires="a14">
           <p:sp>
             <p:nvSpPr>
               <p:cNvPr id="7" name="CasellaDiTesto 6">
@@ -27093,6 +27092,7 @@
                             <a:lumOff val="25000"/>
                           </a:schemeClr>
                         </a:solidFill>
+                        <a:latin typeface="Cambria Math" panose="02040503050406030204" pitchFamily="18" charset="0"/>
                       </a:rPr>
                       <m:t>1</m:t>
                     </m:r>
@@ -27119,6 +27119,7 @@
                             <a:lumOff val="25000"/>
                           </a:schemeClr>
                         </a:solidFill>
+                        <a:latin typeface="Cambria Math" panose="02040503050406030204" pitchFamily="18" charset="0"/>
                       </a:rPr>
                       <m:t>1</m:t>
                     </m:r>
@@ -27145,6 +27146,7 @@
                             <a:lumOff val="25000"/>
                           </a:schemeClr>
                         </a:solidFill>
+                        <a:latin typeface="Cambria Math" panose="02040503050406030204" pitchFamily="18" charset="0"/>
                       </a:rPr>
                       <m:t>𝛼</m:t>
                     </m:r>
@@ -27156,6 +27158,7 @@
                             <a:lumOff val="25000"/>
                           </a:schemeClr>
                         </a:solidFill>
+                        <a:latin typeface="Cambria Math" panose="02040503050406030204" pitchFamily="18" charset="0"/>
                       </a:rPr>
                       <m:t>′′</m:t>
                     </m:r>
@@ -27182,6 +27185,7 @@
                             <a:lumOff val="25000"/>
                           </a:schemeClr>
                         </a:solidFill>
+                        <a:latin typeface="Cambria Math" panose="02040503050406030204" pitchFamily="18" charset="0"/>
                       </a:rPr>
                       <m:t>2</m:t>
                     </m:r>
@@ -27211,7 +27215,7 @@
             </p:txBody>
           </p:sp>
         </mc:Choice>
-        <mc:Fallback>
+        <mc:Fallback xmlns="">
           <p:sp>
             <p:nvSpPr>
               <p:cNvPr id="7" name="CasellaDiTesto 6">
@@ -27276,8 +27280,8 @@
             <a:chExt cx="1523238" cy="723304"/>
           </a:xfrm>
         </p:grpSpPr>
-        <mc:AlternateContent xmlns:mc="http://schemas.openxmlformats.org/markup-compatibility/2006">
-          <mc:Choice xmlns:a14="http://schemas.microsoft.com/office/drawing/2010/main" Requires="a14">
+        <mc:AlternateContent xmlns:mc="http://schemas.openxmlformats.org/markup-compatibility/2006" xmlns:a14="http://schemas.microsoft.com/office/drawing/2010/main">
+          <mc:Choice Requires="a14">
             <p:sp>
               <p:nvSpPr>
                 <p:cNvPr id="9" name="CasellaDiTesto 8">
@@ -27398,7 +27402,7 @@
               </p:txBody>
             </p:sp>
           </mc:Choice>
-          <mc:Fallback>
+          <mc:Fallback xmlns="">
             <p:sp>
               <p:nvSpPr>
                 <p:cNvPr id="9" name="CasellaDiTesto 8">
@@ -27443,8 +27447,8 @@
             </p:sp>
           </mc:Fallback>
         </mc:AlternateContent>
-        <mc:AlternateContent xmlns:mc="http://schemas.openxmlformats.org/markup-compatibility/2006">
-          <mc:Choice xmlns:a14="http://schemas.microsoft.com/office/drawing/2010/main" Requires="a14">
+        <mc:AlternateContent xmlns:mc="http://schemas.openxmlformats.org/markup-compatibility/2006" xmlns:a14="http://schemas.microsoft.com/office/drawing/2010/main">
+          <mc:Choice Requires="a14">
             <p:sp>
               <p:nvSpPr>
                 <p:cNvPr id="10" name="CasellaDiTesto 9">
@@ -27507,7 +27511,7 @@
               </p:txBody>
             </p:sp>
           </mc:Choice>
-          <mc:Fallback>
+          <mc:Fallback xmlns="">
             <p:sp>
               <p:nvSpPr>
                 <p:cNvPr id="10" name="CasellaDiTesto 9">
@@ -27589,8 +27593,8 @@
           </a:prstGeom>
         </p:spPr>
       </p:pic>
-      <mc:AlternateContent xmlns:mc="http://schemas.openxmlformats.org/markup-compatibility/2006">
-        <mc:Choice xmlns:a14="http://schemas.microsoft.com/office/drawing/2010/main" Requires="a14">
+      <mc:AlternateContent xmlns:mc="http://schemas.openxmlformats.org/markup-compatibility/2006" xmlns:a14="http://schemas.microsoft.com/office/drawing/2010/main">
+        <mc:Choice Requires="a14">
           <p:sp>
             <p:nvSpPr>
               <p:cNvPr id="12" name="Segnaposto contenuto 2">
@@ -27899,7 +27903,7 @@
             </p:txBody>
           </p:sp>
         </mc:Choice>
-        <mc:Fallback>
+        <mc:Fallback xmlns="">
           <p:sp>
             <p:nvSpPr>
               <p:cNvPr id="12" name="Segnaposto contenuto 2">
@@ -28656,7 +28660,7 @@
 </file>
 
 <file path=ppt/slides/slide26.xml><?xml version="1.0" encoding="utf-8"?>
-<p:sld xmlns:a="http://schemas.openxmlformats.org/drawingml/2006/main" xmlns:r="http://schemas.openxmlformats.org/officeDocument/2006/relationships" xmlns:p="http://schemas.openxmlformats.org/presentationml/2006/main">
+<p:sld xmlns:a="http://schemas.openxmlformats.org/drawingml/2006/main" xmlns:r="http://schemas.openxmlformats.org/officeDocument/2006/relationships" xmlns:p="http://schemas.openxmlformats.org/presentationml/2006/main" show="0">
   <p:cSld>
     <p:spTree>
       <p:nvGrpSpPr>
@@ -28733,8 +28737,16 @@
               <a:buNone/>
             </a:pPr>
             <a:r>
-              <a:rPr lang="it-IT"/>
-              <a:t>Per prima cosa definiamo il una caratteristica del pattern ɣ, un ordinamento parziale ≤ɣ composto dalle coppie (i,k) che indicano un processo i  ad un dato tempo k.</a:t>
+              <a:rPr lang="it-IT" dirty="0"/>
+              <a:t>Per prima cosa definiamo il una caratteristica del pattern ɣ, un ordinamento parziale ≤ɣ composto dalle coppie (</a:t>
+            </a:r>
+            <a:r>
+              <a:rPr lang="it-IT" dirty="0" err="1"/>
+              <a:t>i,k</a:t>
+            </a:r>
+            <a:r>
+              <a:rPr lang="it-IT" dirty="0"/>
+              <a:t>) che indicano un processo i  ad un dato tempo k.</a:t>
             </a:r>
           </a:p>
           <a:p>
@@ -28748,7 +28760,7 @@
               <a:buNone/>
             </a:pPr>
             <a:r>
-              <a:rPr lang="it-IT"/>
+              <a:rPr lang="it-IT" dirty="0"/>
               <a:t>≤ɣ rappresenta la “quantità di informazione” ricevuta dai nodi (quante informazioni hanno sugli altri nodi).</a:t>
             </a:r>
           </a:p>
@@ -28764,7 +28776,7 @@
               <a:buChar char="v"/>
             </a:pPr>
             <a:r>
-              <a:rPr lang="it-IT"/>
+              <a:rPr lang="it-IT" dirty="0"/>
               <a:t>( i, k) ≤ɣ ( i, k’) per ogni i se 1 ≤ i ≤ n e 0 ≤ k ≤ k’.</a:t>
             </a:r>
           </a:p>
@@ -28780,7 +28792,7 @@
               <a:buChar char="v"/>
             </a:pPr>
             <a:r>
-              <a:rPr lang="it-IT"/>
+              <a:rPr lang="it-IT" dirty="0"/>
               <a:t>se ( i, j, k) appartiene a ɣ, ( i, k-1) ≤ɣ (j, k).</a:t>
             </a:r>
           </a:p>
@@ -28790,12 +28802,52 @@
               <a:buChar char="v"/>
             </a:pPr>
             <a:r>
-              <a:rPr lang="it-IT"/>
-              <a:t>se (i,k) ≤ɣ (i’, k’) e (i’,k’) ≤ɣ (i’’,k’’) allora (i,k) ≤ɣ (i’’,k’’). “≤ɣ” è una operazione transitiva</a:t>
+              <a:rPr lang="it-IT" dirty="0"/>
+              <a:t>se (</a:t>
+            </a:r>
+            <a:r>
+              <a:rPr lang="it-IT" dirty="0" err="1"/>
+              <a:t>i,k</a:t>
+            </a:r>
+            <a:r>
+              <a:rPr lang="it-IT" dirty="0"/>
+              <a:t>) ≤ɣ (i’, k’) e (</a:t>
+            </a:r>
+            <a:r>
+              <a:rPr lang="it-IT" dirty="0" err="1"/>
+              <a:t>i’,k</a:t>
+            </a:r>
+            <a:r>
+              <a:rPr lang="it-IT" dirty="0"/>
+              <a:t>’) ≤ɣ (</a:t>
+            </a:r>
+            <a:r>
+              <a:rPr lang="it-IT" dirty="0" err="1"/>
+              <a:t>i’’,k</a:t>
+            </a:r>
+            <a:r>
+              <a:rPr lang="it-IT" dirty="0"/>
+              <a:t>’’) allora (</a:t>
+            </a:r>
+            <a:r>
+              <a:rPr lang="it-IT" dirty="0" err="1"/>
+              <a:t>i,k</a:t>
+            </a:r>
+            <a:r>
+              <a:rPr lang="it-IT" dirty="0"/>
+              <a:t>) ≤ɣ (</a:t>
+            </a:r>
+            <a:r>
+              <a:rPr lang="it-IT" dirty="0" err="1"/>
+              <a:t>i’’,k</a:t>
+            </a:r>
+            <a:r>
+              <a:rPr lang="it-IT" dirty="0"/>
+              <a:t>’’). “≤ɣ” è una operazione transitiva</a:t>
             </a:r>
           </a:p>
           <a:p>
-            <a:endParaRPr lang="it-IT"/>
+            <a:endParaRPr lang="it-IT" dirty="0"/>
           </a:p>
         </p:txBody>
       </p:sp>
@@ -28892,33 +28944,25 @@
         <p:spPr/>
         <p:txBody>
           <a:bodyPr>
-            <a:normAutofit/>
+            <a:normAutofit lnSpcReduction="10000"/>
           </a:bodyPr>
           <a:lstStyle/>
           <a:p>
-            <a:pPr marL="342900" lvl="0" indent="-342900" fontAlgn="base">
+            <a:pPr marL="0" lvl="0" indent="0" fontAlgn="base">
               <a:lnSpc>
                 <a:spcPct val="107000"/>
               </a:lnSpc>
               <a:spcAft>
                 <a:spcPts val="800"/>
               </a:spcAft>
-              <a:buFont typeface="+mj-lt"/>
-              <a:buAutoNum type="arabicPeriod"/>
+              <a:buNone/>
               <a:tabLst>
                 <a:tab pos="457200" algn="l"/>
               </a:tabLst>
             </a:pPr>
             <a:r>
-              <a:rPr lang="it-IT"/>
-              <a:t>se k = 0.</a:t>
-            </a:r>
-            <a:br>
-              <a:rPr lang="it-IT"/>
-            </a:br>
-            <a:r>
-              <a:rPr lang="it-IT"/>
-              <a:t>levelɣ(i,k) = 0, il nodo non può aver ricevuto alcuna informazione</a:t>
+              <a:rPr lang="it-IT" dirty="0"/>
+              <a:t>≤ɣ è un ordinamento parziale che può essere visto come “quantità di informazione” ricevuta dai nodi</a:t>
             </a:r>
           </a:p>
           <a:p>
@@ -28936,38 +28980,160 @@
               </a:tabLst>
             </a:pPr>
             <a:r>
-              <a:rPr lang="it-IT"/>
-              <a:t>se k &gt;0 ed esiste un j != i tale che (j,0) !≤ɣ (i,k)</a:t>
+              <a:rPr lang="it-IT" dirty="0"/>
+              <a:t>se k = 0.</a:t>
+            </a:r>
+            <a:br>
+              <a:rPr lang="it-IT" dirty="0"/>
+            </a:br>
+            <a:r>
+              <a:rPr lang="it-IT" dirty="0" err="1"/>
+              <a:t>levelɣ</a:t>
+            </a:r>
+            <a:r>
+              <a:rPr lang="it-IT" dirty="0"/>
+              <a:t>(</a:t>
+            </a:r>
+            <a:r>
+              <a:rPr lang="it-IT" dirty="0" err="1"/>
+              <a:t>i,k</a:t>
+            </a:r>
+            <a:r>
+              <a:rPr lang="it-IT" dirty="0"/>
+              <a:t>) = 0, il nodo non può aver ricevuto alcuna informazione</a:t>
             </a:r>
           </a:p>
           <a:p>
-            <a:pPr marL="457200">
+            <a:pPr marL="342900" lvl="0" indent="-342900" fontAlgn="base">
               <a:lnSpc>
                 <a:spcPct val="107000"/>
               </a:lnSpc>
               <a:spcAft>
                 <a:spcPts val="800"/>
               </a:spcAft>
+              <a:buFont typeface="+mj-lt"/>
+              <a:buAutoNum type="arabicPeriod"/>
+              <a:tabLst>
+                <a:tab pos="457200" algn="l"/>
+              </a:tabLst>
             </a:pPr>
             <a:r>
-              <a:rPr lang="it-IT"/>
-              <a:t>levelɣ (i,k) = 0. la situazione (j,0) !≤ɣ (i,k) si verifica solamente quando i round passano ma i non riceve alcun messaggio, perciò se i non riceve messaggi il suo livello non aumenta.</a:t>
+              <a:rPr lang="it-IT" dirty="0"/>
+              <a:t>se k &gt;0 ed esiste un j != i tale che (j,0) !≤ɣ (</a:t>
+            </a:r>
+            <a:r>
+              <a:rPr lang="it-IT" dirty="0" err="1"/>
+              <a:t>i,k</a:t>
+            </a:r>
+            <a:r>
+              <a:rPr lang="it-IT" dirty="0"/>
+              <a:t>)</a:t>
+            </a:r>
+            <a:br>
+              <a:rPr lang="it-IT" dirty="0"/>
+            </a:br>
+            <a:r>
+              <a:rPr lang="it-IT" dirty="0" err="1"/>
+              <a:t>levelɣ</a:t>
+            </a:r>
+            <a:r>
+              <a:rPr lang="it-IT" dirty="0"/>
+              <a:t> (</a:t>
+            </a:r>
+            <a:r>
+              <a:rPr lang="it-IT" dirty="0" err="1"/>
+              <a:t>i,k</a:t>
+            </a:r>
+            <a:r>
+              <a:rPr lang="it-IT" dirty="0"/>
+              <a:t>) = 0. la situazione (j,0) !≤ɣ (</a:t>
+            </a:r>
+            <a:r>
+              <a:rPr lang="it-IT" dirty="0" err="1"/>
+              <a:t>i,k</a:t>
+            </a:r>
+            <a:r>
+              <a:rPr lang="it-IT" dirty="0"/>
+              <a:t>) si verifica solamente quando i round passano ma i non riceve alcun messaggio, perciò se i non riceve messaggi il suo livello non aumenta. </a:t>
             </a:r>
           </a:p>
           <a:p>
-            <a:pPr marL="457200">
+            <a:pPr marL="342900" lvl="0" indent="-342900" fontAlgn="base">
               <a:lnSpc>
                 <a:spcPct val="107000"/>
               </a:lnSpc>
               <a:spcAft>
                 <a:spcPts val="800"/>
               </a:spcAft>
+              <a:buFont typeface="+mj-lt"/>
+              <a:buAutoNum type="arabicPeriod"/>
+              <a:tabLst>
+                <a:tab pos="457200" algn="l"/>
+              </a:tabLst>
             </a:pPr>
             <a:r>
-              <a:rPr lang="it-IT"/>
-              <a:t>3)     se k &gt;0 e (j,0) ≤ɣ (i,k) per tutti i j != i levelɣ(i,k) = 1 + min{ max{levelɣ(j,k), considerando tutti i k} , considerando tutti i j != i}. In pratica ogni processo non può passare ad un livello successivo finchè non ha saputo che tutti gli altri processi hanno raggiunto il livello attuale.</a:t>
+              <a:rPr lang="it-IT" dirty="0"/>
+              <a:t>se k &gt;0 e (j,0) ≤ɣ (</a:t>
             </a:r>
-            <a:endParaRPr lang="it-IT" dirty="0"/>
+            <a:r>
+              <a:rPr lang="it-IT" dirty="0" err="1"/>
+              <a:t>i,k</a:t>
+            </a:r>
+            <a:r>
+              <a:rPr lang="it-IT" dirty="0"/>
+              <a:t>) per tutti i j != i </a:t>
+            </a:r>
+            <a:r>
+              <a:rPr lang="it-IT" dirty="0" err="1"/>
+              <a:t>levelɣ</a:t>
+            </a:r>
+            <a:r>
+              <a:rPr lang="it-IT" dirty="0"/>
+              <a:t>(</a:t>
+            </a:r>
+            <a:r>
+              <a:rPr lang="it-IT" dirty="0" err="1"/>
+              <a:t>i,k</a:t>
+            </a:r>
+            <a:r>
+              <a:rPr lang="it-IT" dirty="0"/>
+              <a:t>) = 1 + min{</a:t>
+            </a:r>
+            <a:r>
+              <a:rPr lang="it-IT" dirty="0" err="1"/>
+              <a:t>levelɣ</a:t>
+            </a:r>
+            <a:r>
+              <a:rPr lang="it-IT" dirty="0"/>
+              <a:t>(</a:t>
+            </a:r>
+            <a:r>
+              <a:rPr lang="it-IT" dirty="0" err="1"/>
+              <a:t>j,k</a:t>
+            </a:r>
+            <a:r>
+              <a:rPr lang="it-IT" u="sng" dirty="0"/>
+              <a:t>)}.</a:t>
+            </a:r>
+            <a:r>
+              <a:rPr lang="it-IT" dirty="0"/>
+              <a:t> </a:t>
+            </a:r>
+            <a:br>
+              <a:rPr lang="it-IT" dirty="0"/>
+            </a:br>
+            <a:r>
+              <a:rPr lang="it-IT" dirty="0"/>
+              <a:t>In pratica ogni processo non può passare ad un livello successivo </a:t>
+            </a:r>
+            <a:r>
+              <a:rPr lang="it-IT" dirty="0" err="1"/>
+              <a:t>finchè</a:t>
+            </a:r>
+            <a:r>
+              <a:rPr lang="it-IT" dirty="0"/>
+              <a:t> non ha saputo che tutti gli altri processi hanno raggiunto il livello attuale.</a:t>
+            </a:r>
           </a:p>
         </p:txBody>
       </p:sp>
@@ -29029,67 +29195,335 @@
           </a:p>
         </p:txBody>
       </p:sp>
-      <p:sp>
-        <p:nvSpPr>
-          <p:cNvPr id="3" name="Segnaposto contenuto 2">
-            <a:extLst>
-              <a:ext uri="{FF2B5EF4-FFF2-40B4-BE49-F238E27FC236}">
-                <a16:creationId xmlns:a16="http://schemas.microsoft.com/office/drawing/2014/main" id="{B9F53D77-5544-41E6-8348-5265EDE4CAE1}"/>
-              </a:ext>
-            </a:extLst>
-          </p:cNvPr>
-          <p:cNvSpPr>
-            <a:spLocks noGrp="1"/>
-          </p:cNvSpPr>
-          <p:nvPr>
-            <p:ph idx="1"/>
-          </p:nvPr>
-        </p:nvSpPr>
-        <p:spPr>
-          <a:xfrm>
-            <a:off x="838200" y="1816100"/>
-            <a:ext cx="10515600" cy="4351338"/>
-          </a:xfrm>
-        </p:spPr>
-        <p:txBody>
-          <a:bodyPr/>
-          <a:lstStyle/>
-          <a:p>
-            <a:r>
-              <a:rPr lang="en-US"/>
-              <a:t>Lemma 5.2 Per ogni communication pattern buono ~/, posti:</a:t>
-            </a:r>
-          </a:p>
-          <a:p>
-            <a:pPr lvl="1"/>
-            <a:r>
-              <a:rPr lang="en-US" sz="2000"/>
-              <a:t>K tale che 0 &lt;_ k &lt;_ r</a:t>
-            </a:r>
-          </a:p>
-          <a:p>
-            <a:pPr lvl="1"/>
-            <a:r>
-              <a:rPr lang="en-US" sz="2000"/>
-              <a:t>i e j, due processi qualsiasi</a:t>
-            </a:r>
-          </a:p>
-          <a:p>
-            <a:pPr lvl="1"/>
-            <a:endParaRPr lang="en-US" sz="2000"/>
-          </a:p>
-          <a:p>
-            <a:pPr marL="457200" lvl="1" indent="0" algn="ctr">
-              <a:buNone/>
-            </a:pPr>
-            <a:r>
-              <a:rPr lang="en-US" sz="2000"/>
-              <a:t>]level~(i, k) - level~(j, k)] &lt;_ 1</a:t>
-            </a:r>
-            <a:endParaRPr lang="en-US" dirty="0"/>
-          </a:p>
-        </p:txBody>
-      </p:sp>
+      <mc:AlternateContent xmlns:mc="http://schemas.openxmlformats.org/markup-compatibility/2006" xmlns:a14="http://schemas.microsoft.com/office/drawing/2010/main">
+        <mc:Choice Requires="a14">
+          <p:sp>
+            <p:nvSpPr>
+              <p:cNvPr id="3" name="Segnaposto contenuto 2">
+                <a:extLst>
+                  <a:ext uri="{FF2B5EF4-FFF2-40B4-BE49-F238E27FC236}">
+                    <a16:creationId xmlns:a16="http://schemas.microsoft.com/office/drawing/2014/main" id="{B9F53D77-5544-41E6-8348-5265EDE4CAE1}"/>
+                  </a:ext>
+                </a:extLst>
+              </p:cNvPr>
+              <p:cNvSpPr>
+                <a:spLocks noGrp="1"/>
+              </p:cNvSpPr>
+              <p:nvPr>
+                <p:ph idx="1"/>
+              </p:nvPr>
+            </p:nvSpPr>
+            <p:spPr>
+              <a:xfrm>
+                <a:off x="838200" y="1816100"/>
+                <a:ext cx="10515600" cy="4351338"/>
+              </a:xfrm>
+            </p:spPr>
+            <p:txBody>
+              <a:bodyPr/>
+              <a:lstStyle/>
+              <a:p>
+                <a:r>
+                  <a:rPr lang="en-US" dirty="0"/>
+                  <a:t>Lemma 5.2 Per </a:t>
+                </a:r>
+                <a:r>
+                  <a:rPr lang="en-US" dirty="0" err="1"/>
+                  <a:t>ogni</a:t>
+                </a:r>
+                <a:r>
+                  <a:rPr lang="en-US" dirty="0"/>
+                  <a:t> communication pattern </a:t>
+                </a:r>
+                <a:r>
+                  <a:rPr lang="en-US" dirty="0" err="1"/>
+                  <a:t>buono</a:t>
+                </a:r>
+                <a:r>
+                  <a:rPr lang="en-US" dirty="0"/>
+                  <a:t> “</a:t>
+                </a:r>
+                <a14:m>
+                  <m:oMath xmlns:m="http://schemas.openxmlformats.org/officeDocument/2006/math">
+                    <m:r>
+                      <a:rPr lang="it-IT" sz="2000" i="1" dirty="0" err="1" smtClean="0">
+                        <a:latin typeface="Cambria Math" panose="02040503050406030204" pitchFamily="18" charset="0"/>
+                      </a:rPr>
+                      <m:t>ɣ</m:t>
+                    </m:r>
+                  </m:oMath>
+                </a14:m>
+                <a:r>
+                  <a:rPr lang="en-US" dirty="0"/>
+                  <a:t>”, </a:t>
+                </a:r>
+                <a:r>
+                  <a:rPr lang="en-US" dirty="0" err="1"/>
+                  <a:t>posti</a:t>
+                </a:r>
+                <a:r>
+                  <a:rPr lang="en-US" dirty="0"/>
+                  <a:t>:</a:t>
+                </a:r>
+              </a:p>
+              <a:p>
+                <a:pPr lvl="1"/>
+                <a:r>
+                  <a:rPr lang="en-US" sz="2000" i="1" dirty="0"/>
+                  <a:t>K</a:t>
+                </a:r>
+                <a:r>
+                  <a:rPr lang="en-US" sz="2000" dirty="0"/>
+                  <a:t> tale </a:t>
+                </a:r>
+                <a:r>
+                  <a:rPr lang="en-US" sz="2000" dirty="0" err="1"/>
+                  <a:t>che</a:t>
+                </a:r>
+                <a:r>
+                  <a:rPr lang="en-US" sz="2000" dirty="0"/>
+                  <a:t> </a:t>
+                </a:r>
+                <a14:m>
+                  <m:oMath xmlns:m="http://schemas.openxmlformats.org/officeDocument/2006/math">
+                    <m:r>
+                      <a:rPr lang="en-US" sz="2000" i="1" dirty="0" smtClean="0">
+                        <a:latin typeface="Cambria Math" panose="02040503050406030204" pitchFamily="18" charset="0"/>
+                      </a:rPr>
+                      <m:t>0</m:t>
+                    </m:r>
+                    <m:r>
+                      <a:rPr lang="it-IT" sz="2000" b="0" i="1" dirty="0" smtClean="0">
+                        <a:latin typeface="Cambria Math" panose="02040503050406030204" pitchFamily="18" charset="0"/>
+                      </a:rPr>
+                      <m:t>≤</m:t>
+                    </m:r>
+                    <m:r>
+                      <a:rPr lang="en-US" sz="2000" i="1" dirty="0" smtClean="0">
+                        <a:latin typeface="Cambria Math" panose="02040503050406030204" pitchFamily="18" charset="0"/>
+                      </a:rPr>
+                      <m:t> </m:t>
+                    </m:r>
+                    <m:r>
+                      <a:rPr lang="en-US" sz="2000" i="1" dirty="0" smtClean="0">
+                        <a:latin typeface="Cambria Math" panose="02040503050406030204" pitchFamily="18" charset="0"/>
+                      </a:rPr>
+                      <m:t>𝑘</m:t>
+                    </m:r>
+                    <m:r>
+                      <a:rPr lang="it-IT" sz="2000" b="0" i="1" dirty="0" smtClean="0">
+                        <a:latin typeface="Cambria Math" panose="02040503050406030204" pitchFamily="18" charset="0"/>
+                      </a:rPr>
+                      <m:t>≤</m:t>
+                    </m:r>
+                    <m:r>
+                      <a:rPr lang="en-US" sz="2000" i="1" dirty="0" smtClean="0">
+                        <a:latin typeface="Cambria Math" panose="02040503050406030204" pitchFamily="18" charset="0"/>
+                      </a:rPr>
+                      <m:t> </m:t>
+                    </m:r>
+                    <m:r>
+                      <a:rPr lang="en-US" sz="2000" i="1" dirty="0" smtClean="0">
+                        <a:latin typeface="Cambria Math" panose="02040503050406030204" pitchFamily="18" charset="0"/>
+                      </a:rPr>
+                      <m:t>𝑟</m:t>
+                    </m:r>
+                  </m:oMath>
+                </a14:m>
+                <a:endParaRPr lang="en-US" sz="2000" dirty="0"/>
+              </a:p>
+              <a:p>
+                <a:pPr lvl="1"/>
+                <a:r>
+                  <a:rPr lang="en-US" sz="2000" i="1" dirty="0" err="1"/>
+                  <a:t>i</a:t>
+                </a:r>
+                <a:r>
+                  <a:rPr lang="en-US" sz="2000" i="1" dirty="0"/>
+                  <a:t> </a:t>
+                </a:r>
+                <a:r>
+                  <a:rPr lang="en-US" sz="2000" dirty="0"/>
+                  <a:t>e</a:t>
+                </a:r>
+                <a:r>
+                  <a:rPr lang="en-US" sz="2000" i="1" dirty="0"/>
+                  <a:t> j</a:t>
+                </a:r>
+                <a:r>
+                  <a:rPr lang="en-US" sz="2000" dirty="0"/>
+                  <a:t>, due </a:t>
+                </a:r>
+                <a:r>
+                  <a:rPr lang="en-US" sz="2000" dirty="0" err="1"/>
+                  <a:t>processi</a:t>
+                </a:r>
+                <a:r>
+                  <a:rPr lang="en-US" sz="2000" dirty="0"/>
+                  <a:t> </a:t>
+                </a:r>
+                <a:r>
+                  <a:rPr lang="en-US" sz="2000" dirty="0" err="1"/>
+                  <a:t>qualsiasi</a:t>
+                </a:r>
+                <a:endParaRPr lang="en-US" sz="2000" dirty="0"/>
+              </a:p>
+              <a:p>
+                <a:pPr lvl="1"/>
+                <a:endParaRPr lang="en-US" sz="2000" dirty="0"/>
+              </a:p>
+              <a:p>
+                <a:pPr marL="457200" lvl="1" indent="0" algn="ctr">
+                  <a:buNone/>
+                </a:pPr>
+                <a14:m>
+                  <m:oMathPara xmlns:m="http://schemas.openxmlformats.org/officeDocument/2006/math">
+                    <m:oMathParaPr>
+                      <m:jc m:val="centerGroup"/>
+                    </m:oMathParaPr>
+                    <m:oMath xmlns:m="http://schemas.openxmlformats.org/officeDocument/2006/math">
+                      <m:r>
+                        <a:rPr lang="en-US" sz="2000" i="1" dirty="0" smtClean="0">
+                          <a:latin typeface="Cambria Math" panose="02040503050406030204" pitchFamily="18" charset="0"/>
+                        </a:rPr>
+                        <m:t>| </m:t>
+                      </m:r>
+                      <m:r>
+                        <a:rPr lang="it-IT" sz="2400" i="1" dirty="0" err="1" smtClean="0">
+                          <a:latin typeface="Cambria Math" panose="02040503050406030204" pitchFamily="18" charset="0"/>
+                        </a:rPr>
+                        <m:t>𝑙𝑒𝑣𝑒𝑙</m:t>
+                      </m:r>
+                      <m:r>
+                        <a:rPr lang="it-IT" sz="2400" i="1" dirty="0" err="1" smtClean="0">
+                          <a:latin typeface="Cambria Math" panose="02040503050406030204" pitchFamily="18" charset="0"/>
+                        </a:rPr>
+                        <m:t>ɣ</m:t>
+                      </m:r>
+                      <m:r>
+                        <a:rPr lang="en-US" sz="2000" i="1" dirty="0" smtClean="0">
+                          <a:latin typeface="Cambria Math" panose="02040503050406030204" pitchFamily="18" charset="0"/>
+                        </a:rPr>
+                        <m:t>(</m:t>
+                      </m:r>
+                      <m:r>
+                        <a:rPr lang="en-US" sz="2000" i="1" dirty="0" err="1" smtClean="0">
+                          <a:latin typeface="Cambria Math" panose="02040503050406030204" pitchFamily="18" charset="0"/>
+                        </a:rPr>
+                        <m:t>𝑖</m:t>
+                      </m:r>
+                      <m:r>
+                        <a:rPr lang="en-US" sz="2000" i="1" dirty="0" smtClean="0">
+                          <a:latin typeface="Cambria Math" panose="02040503050406030204" pitchFamily="18" charset="0"/>
+                        </a:rPr>
+                        <m:t>, </m:t>
+                      </m:r>
+                      <m:r>
+                        <a:rPr lang="en-US" sz="2000" i="1" dirty="0" smtClean="0">
+                          <a:latin typeface="Cambria Math" panose="02040503050406030204" pitchFamily="18" charset="0"/>
+                        </a:rPr>
+                        <m:t>𝑘</m:t>
+                      </m:r>
+                      <m:r>
+                        <a:rPr lang="en-US" sz="2000" i="1" dirty="0" smtClean="0">
+                          <a:latin typeface="Cambria Math" panose="02040503050406030204" pitchFamily="18" charset="0"/>
+                        </a:rPr>
+                        <m:t>) − </m:t>
+                      </m:r>
+                      <m:r>
+                        <a:rPr lang="it-IT" sz="2400" i="1" dirty="0" err="1" smtClean="0">
+                          <a:latin typeface="Cambria Math" panose="02040503050406030204" pitchFamily="18" charset="0"/>
+                        </a:rPr>
+                        <m:t>𝑙𝑒𝑣𝑒𝑙</m:t>
+                      </m:r>
+                      <m:r>
+                        <a:rPr lang="it-IT" sz="2400" i="1" dirty="0" err="1" smtClean="0">
+                          <a:latin typeface="Cambria Math" panose="02040503050406030204" pitchFamily="18" charset="0"/>
+                        </a:rPr>
+                        <m:t>ɣ</m:t>
+                      </m:r>
+                      <m:r>
+                        <a:rPr lang="en-US" sz="2000" i="1" dirty="0" smtClean="0">
+                          <a:latin typeface="Cambria Math" panose="02040503050406030204" pitchFamily="18" charset="0"/>
+                        </a:rPr>
+                        <m:t>(</m:t>
+                      </m:r>
+                      <m:r>
+                        <a:rPr lang="en-US" sz="2000" i="1" dirty="0" smtClean="0">
+                          <a:latin typeface="Cambria Math" panose="02040503050406030204" pitchFamily="18" charset="0"/>
+                        </a:rPr>
+                        <m:t>𝑗</m:t>
+                      </m:r>
+                      <m:r>
+                        <a:rPr lang="en-US" sz="2000" i="1" dirty="0" smtClean="0">
+                          <a:latin typeface="Cambria Math" panose="02040503050406030204" pitchFamily="18" charset="0"/>
+                        </a:rPr>
+                        <m:t>, </m:t>
+                      </m:r>
+                      <m:r>
+                        <a:rPr lang="en-US" sz="2000" i="1" dirty="0" smtClean="0">
+                          <a:latin typeface="Cambria Math" panose="02040503050406030204" pitchFamily="18" charset="0"/>
+                        </a:rPr>
+                        <m:t>𝑘</m:t>
+                      </m:r>
+                      <m:r>
+                        <a:rPr lang="en-US" sz="2000" i="1" dirty="0" smtClean="0">
+                          <a:latin typeface="Cambria Math" panose="02040503050406030204" pitchFamily="18" charset="0"/>
+                        </a:rPr>
+                        <m:t>)|≤ 1</m:t>
+                      </m:r>
+                    </m:oMath>
+                  </m:oMathPara>
+                </a14:m>
+                <a:endParaRPr lang="en-US" dirty="0"/>
+              </a:p>
+            </p:txBody>
+          </p:sp>
+        </mc:Choice>
+        <mc:Fallback xmlns="">
+          <p:sp>
+            <p:nvSpPr>
+              <p:cNvPr id="3" name="Segnaposto contenuto 2">
+                <a:extLst>
+                  <a:ext uri="{FF2B5EF4-FFF2-40B4-BE49-F238E27FC236}">
+                    <a16:creationId xmlns:a16="http://schemas.microsoft.com/office/drawing/2014/main" id="{B9F53D77-5544-41E6-8348-5265EDE4CAE1}"/>
+                  </a:ext>
+                </a:extLst>
+              </p:cNvPr>
+              <p:cNvSpPr>
+                <a:spLocks noGrp="1" noRot="1" noChangeAspect="1" noMove="1" noResize="1" noEditPoints="1" noAdjustHandles="1" noChangeArrowheads="1" noChangeShapeType="1" noTextEdit="1"/>
+              </p:cNvSpPr>
+              <p:nvPr>
+                <p:ph idx="1"/>
+              </p:nvPr>
+            </p:nvSpPr>
+            <p:spPr>
+              <a:xfrm>
+                <a:off x="838200" y="1816100"/>
+                <a:ext cx="10515600" cy="4351338"/>
+              </a:xfrm>
+              <a:blipFill>
+                <a:blip r:embed="rId2"/>
+                <a:stretch>
+                  <a:fillRect l="-638" t="-1541"/>
+                </a:stretch>
+              </a:blipFill>
+            </p:spPr>
+            <p:txBody>
+              <a:bodyPr/>
+              <a:lstStyle/>
+              <a:p>
+                <a:r>
+                  <a:rPr lang="it-IT">
+                    <a:noFill/>
+                  </a:rPr>
+                  <a:t> </a:t>
+                </a:r>
+              </a:p>
+            </p:txBody>
+          </p:sp>
+        </mc:Fallback>
+      </mc:AlternateContent>
     </p:spTree>
     <p:extLst>
       <p:ext uri="{BB962C8B-B14F-4D97-AF65-F5344CB8AC3E}">
@@ -29143,7 +29577,7 @@
           <a:p>
             <a:r>
               <a:rPr lang="it-IT" b="1"/>
-              <a:t>Lemma 5.3</a:t>
+              <a:t>Algoritmo informale</a:t>
             </a:r>
           </a:p>
         </p:txBody>
@@ -29164,357 +29598,89 @@
             <p:ph idx="1"/>
           </p:nvPr>
         </p:nvSpPr>
-        <p:spPr>
-          <a:xfrm>
-            <a:off x="838200" y="1816100"/>
-            <a:ext cx="10515600" cy="4351338"/>
-          </a:xfrm>
-        </p:spPr>
+        <p:spPr/>
         <p:txBody>
-          <a:bodyPr/>
+          <a:bodyPr>
+            <a:normAutofit/>
+          </a:bodyPr>
           <a:lstStyle/>
           <a:p>
-            <a:endParaRPr lang="en-US"/>
-          </a:p>
-          <a:p>
-            <a:pPr marL="0" indent="0">
-              <a:buNone/>
+            <a:pPr>
+              <a:lnSpc>
+                <a:spcPct val="107000"/>
+              </a:lnSpc>
+              <a:spcAft>
+                <a:spcPts val="800"/>
+              </a:spcAft>
             </a:pPr>
             <a:r>
-              <a:rPr lang="en-US"/>
-              <a:t>Se tutti i messaggi sono stati ricevuti, dato un numero di rounds k, si ha che:</a:t>
+              <a:rPr lang="it-IT"/>
+              <a:t>ogni processo tiene traccia del suo livello (e di quello degli altri), e di un valore “key”.</a:t>
             </a:r>
           </a:p>
           <a:p>
-            <a:pPr marL="457200" lvl="1" indent="0" algn="ctr">
-              <a:buNone/>
+            <a:pPr>
+              <a:lnSpc>
+                <a:spcPct val="107000"/>
+              </a:lnSpc>
+              <a:spcAft>
+                <a:spcPts val="800"/>
+              </a:spcAft>
             </a:pPr>
             <a:r>
-              <a:rPr lang="it-IT" sz="2000"/>
-              <a:t>levelγ(i, k)=k</a:t>
+              <a:rPr lang="it-IT"/>
+              <a:t>Ogni nodo tiene traccia di tutti i valori di decisione iniziali degli altri nodi.</a:t>
             </a:r>
           </a:p>
           <a:p>
-            <a:pPr marL="457200" lvl="1" indent="0" algn="ctr">
-              <a:buNone/>
+            <a:pPr>
+              <a:lnSpc>
+                <a:spcPct val="107000"/>
+              </a:lnSpc>
+              <a:spcAft>
+                <a:spcPts val="800"/>
+              </a:spcAft>
             </a:pPr>
-            <a:endParaRPr lang="it-IT"/>
-          </a:p>
-        </p:txBody>
-      </p:sp>
-      <p:pic>
-        <p:nvPicPr>
-          <p:cNvPr id="5" name="Immagine 4">
-            <a:extLst>
-              <a:ext uri="{FF2B5EF4-FFF2-40B4-BE49-F238E27FC236}">
-                <a16:creationId xmlns:a16="http://schemas.microsoft.com/office/drawing/2014/main" id="{3E8D1540-BD44-4B52-93CF-D0267BD11737}"/>
-              </a:ext>
-            </a:extLst>
-          </p:cNvPr>
-          <p:cNvPicPr>
-            <a:picLocks noChangeAspect="1"/>
-          </p:cNvPicPr>
-          <p:nvPr/>
-        </p:nvPicPr>
-        <p:blipFill rotWithShape="1">
-          <a:blip r:embed="rId2"/>
-          <a:srcRect t="10158"/>
-          <a:stretch/>
-        </p:blipFill>
-        <p:spPr>
-          <a:xfrm>
-            <a:off x="4850676" y="3225800"/>
-            <a:ext cx="3212670" cy="3429000"/>
-          </a:xfrm>
-          <a:prstGeom prst="rect">
-            <a:avLst/>
-          </a:prstGeom>
-        </p:spPr>
-      </p:pic>
-      <p:sp>
-        <p:nvSpPr>
-          <p:cNvPr id="6" name="CasellaDiTesto 5">
-            <a:extLst>
-              <a:ext uri="{FF2B5EF4-FFF2-40B4-BE49-F238E27FC236}">
-                <a16:creationId xmlns:a16="http://schemas.microsoft.com/office/drawing/2014/main" id="{ACF3489C-23AB-4AF9-89D1-1A162FB5DFE4}"/>
-              </a:ext>
-            </a:extLst>
-          </p:cNvPr>
-          <p:cNvSpPr txBox="1"/>
-          <p:nvPr/>
-        </p:nvSpPr>
-        <p:spPr>
-          <a:xfrm>
-            <a:off x="5273964" y="2915722"/>
-            <a:ext cx="317716" cy="369332"/>
-          </a:xfrm>
-          <a:prstGeom prst="rect">
-            <a:avLst/>
-          </a:prstGeom>
-          <a:noFill/>
-        </p:spPr>
-        <p:txBody>
-          <a:bodyPr wrap="none" rtlCol="0">
-            <a:spAutoFit/>
-          </a:bodyPr>
-          <a:lstStyle/>
-          <a:p>
             <a:r>
-              <a:rPr lang="it-IT" dirty="0"/>
-              <a:t>A</a:t>
+              <a:rPr lang="it-IT"/>
+              <a:t>key è un intero compreso tra 1 ed r, deciso dal processo n°1</a:t>
             </a:r>
           </a:p>
-        </p:txBody>
-      </p:sp>
-      <p:sp>
-        <p:nvSpPr>
-          <p:cNvPr id="7" name="CasellaDiTesto 6">
-            <a:extLst>
-              <a:ext uri="{FF2B5EF4-FFF2-40B4-BE49-F238E27FC236}">
-                <a16:creationId xmlns:a16="http://schemas.microsoft.com/office/drawing/2014/main" id="{DC03CD25-B8B6-48D7-BEE0-86F5A7FFB5D1}"/>
-              </a:ext>
-            </a:extLst>
-          </p:cNvPr>
-          <p:cNvSpPr txBox="1"/>
-          <p:nvPr/>
-        </p:nvSpPr>
-        <p:spPr>
-          <a:xfrm>
-            <a:off x="7005782" y="2929247"/>
-            <a:ext cx="317716" cy="369332"/>
-          </a:xfrm>
-          <a:prstGeom prst="rect">
-            <a:avLst/>
-          </a:prstGeom>
-          <a:noFill/>
-        </p:spPr>
-        <p:txBody>
-          <a:bodyPr wrap="none" rtlCol="0">
-            <a:spAutoFit/>
-          </a:bodyPr>
-          <a:lstStyle/>
           <a:p>
+            <a:pPr>
+              <a:lnSpc>
+                <a:spcPct val="107000"/>
+              </a:lnSpc>
+              <a:spcAft>
+                <a:spcPts val="800"/>
+              </a:spcAft>
+            </a:pPr>
             <a:r>
-              <a:rPr lang="it-IT" dirty="0"/>
-              <a:t>B</a:t>
+              <a:rPr lang="it-IT"/>
+              <a:t>Key, value e level sono diffusi tra un nodo e l’altro, piggybacked nei messaggi</a:t>
             </a:r>
           </a:p>
-        </p:txBody>
-      </p:sp>
-      <p:sp>
-        <p:nvSpPr>
-          <p:cNvPr id="8" name="CasellaDiTesto 7">
-            <a:extLst>
-              <a:ext uri="{FF2B5EF4-FFF2-40B4-BE49-F238E27FC236}">
-                <a16:creationId xmlns:a16="http://schemas.microsoft.com/office/drawing/2014/main" id="{E4002B35-5DB3-47E6-8AF4-61901C42DA33}"/>
-              </a:ext>
-            </a:extLst>
-          </p:cNvPr>
-          <p:cNvSpPr txBox="1"/>
-          <p:nvPr/>
-        </p:nvSpPr>
-        <p:spPr>
-          <a:xfrm>
-            <a:off x="7323498" y="4110182"/>
-            <a:ext cx="301686" cy="369332"/>
-          </a:xfrm>
-          <a:prstGeom prst="rect">
-            <a:avLst/>
-          </a:prstGeom>
-          <a:noFill/>
-        </p:spPr>
-        <p:txBody>
-          <a:bodyPr wrap="none" rtlCol="0">
-            <a:spAutoFit/>
-          </a:bodyPr>
-          <a:lstStyle/>
           <a:p>
+            <a:pPr>
+              <a:lnSpc>
+                <a:spcPct val="107000"/>
+              </a:lnSpc>
+              <a:spcAft>
+                <a:spcPts val="800"/>
+              </a:spcAft>
+            </a:pPr>
             <a:r>
-              <a:rPr lang="it-IT" dirty="0"/>
-              <a:t>2</a:t>
+              <a:rPr lang="it-IT"/>
+              <a:t>Dopo r  round ogni processo decide 1 se e solo se il suo livello è &gt;= al valore key e tutti gli initial values dei nodi sono = 1 </a:t>
             </a:r>
-          </a:p>
-        </p:txBody>
-      </p:sp>
-      <p:sp>
-        <p:nvSpPr>
-          <p:cNvPr id="9" name="CasellaDiTesto 8">
-            <a:extLst>
-              <a:ext uri="{FF2B5EF4-FFF2-40B4-BE49-F238E27FC236}">
-                <a16:creationId xmlns:a16="http://schemas.microsoft.com/office/drawing/2014/main" id="{E74962E5-AB9A-4230-B8B2-E0BA4C0E8289}"/>
-              </a:ext>
-            </a:extLst>
-          </p:cNvPr>
-          <p:cNvSpPr txBox="1"/>
-          <p:nvPr/>
-        </p:nvSpPr>
-        <p:spPr>
-          <a:xfrm>
-            <a:off x="4972278" y="4128594"/>
-            <a:ext cx="301686" cy="369332"/>
-          </a:xfrm>
-          <a:prstGeom prst="rect">
-            <a:avLst/>
-          </a:prstGeom>
-          <a:noFill/>
-        </p:spPr>
-        <p:txBody>
-          <a:bodyPr wrap="none" rtlCol="0">
-            <a:spAutoFit/>
-          </a:bodyPr>
-          <a:lstStyle/>
-          <a:p>
-            <a:r>
-              <a:rPr lang="it-IT" dirty="0"/>
-              <a:t>2</a:t>
-            </a:r>
-          </a:p>
-        </p:txBody>
-      </p:sp>
-      <p:sp>
-        <p:nvSpPr>
-          <p:cNvPr id="10" name="CasellaDiTesto 9">
-            <a:extLst>
-              <a:ext uri="{FF2B5EF4-FFF2-40B4-BE49-F238E27FC236}">
-                <a16:creationId xmlns:a16="http://schemas.microsoft.com/office/drawing/2014/main" id="{C32B8BC7-7DC6-4155-9326-D890B5142113}"/>
-              </a:ext>
-            </a:extLst>
-          </p:cNvPr>
-          <p:cNvSpPr txBox="1"/>
-          <p:nvPr/>
-        </p:nvSpPr>
-        <p:spPr>
-          <a:xfrm>
-            <a:off x="7323498" y="4994564"/>
-            <a:ext cx="301686" cy="369332"/>
-          </a:xfrm>
-          <a:prstGeom prst="rect">
-            <a:avLst/>
-          </a:prstGeom>
-          <a:noFill/>
-        </p:spPr>
-        <p:txBody>
-          <a:bodyPr wrap="none" rtlCol="0">
-            <a:spAutoFit/>
-          </a:bodyPr>
-          <a:lstStyle/>
-          <a:p>
-            <a:r>
-              <a:rPr lang="it-IT" dirty="0"/>
-              <a:t>3</a:t>
-            </a:r>
-          </a:p>
-        </p:txBody>
-      </p:sp>
-      <p:sp>
-        <p:nvSpPr>
-          <p:cNvPr id="11" name="CasellaDiTesto 10">
-            <a:extLst>
-              <a:ext uri="{FF2B5EF4-FFF2-40B4-BE49-F238E27FC236}">
-                <a16:creationId xmlns:a16="http://schemas.microsoft.com/office/drawing/2014/main" id="{AD030E58-357A-4F22-A023-114506BFCAD2}"/>
-              </a:ext>
-            </a:extLst>
-          </p:cNvPr>
-          <p:cNvSpPr txBox="1"/>
-          <p:nvPr/>
-        </p:nvSpPr>
-        <p:spPr>
-          <a:xfrm>
-            <a:off x="4972278" y="5031388"/>
-            <a:ext cx="301686" cy="369332"/>
-          </a:xfrm>
-          <a:prstGeom prst="rect">
-            <a:avLst/>
-          </a:prstGeom>
-          <a:noFill/>
-        </p:spPr>
-        <p:txBody>
-          <a:bodyPr wrap="none" rtlCol="0">
-            <a:spAutoFit/>
-          </a:bodyPr>
-          <a:lstStyle/>
-          <a:p>
-            <a:r>
-              <a:rPr lang="it-IT" dirty="0"/>
-              <a:t>3</a:t>
-            </a:r>
-          </a:p>
-        </p:txBody>
-      </p:sp>
-      <p:sp>
-        <p:nvSpPr>
-          <p:cNvPr id="12" name="CasellaDiTesto 11">
-            <a:extLst>
-              <a:ext uri="{FF2B5EF4-FFF2-40B4-BE49-F238E27FC236}">
-                <a16:creationId xmlns:a16="http://schemas.microsoft.com/office/drawing/2014/main" id="{EBB053E0-05E3-455A-AB72-2C0B475B79C1}"/>
-              </a:ext>
-            </a:extLst>
-          </p:cNvPr>
-          <p:cNvSpPr txBox="1"/>
-          <p:nvPr/>
-        </p:nvSpPr>
-        <p:spPr>
-          <a:xfrm>
-            <a:off x="7313793" y="5896080"/>
-            <a:ext cx="301686" cy="369332"/>
-          </a:xfrm>
-          <a:prstGeom prst="rect">
-            <a:avLst/>
-          </a:prstGeom>
-          <a:noFill/>
-        </p:spPr>
-        <p:txBody>
-          <a:bodyPr wrap="none" rtlCol="0">
-            <a:spAutoFit/>
-          </a:bodyPr>
-          <a:lstStyle/>
-          <a:p>
-            <a:r>
-              <a:rPr lang="it-IT" dirty="0"/>
-              <a:t>4</a:t>
-            </a:r>
-          </a:p>
-        </p:txBody>
-      </p:sp>
-      <p:sp>
-        <p:nvSpPr>
-          <p:cNvPr id="13" name="CasellaDiTesto 12">
-            <a:extLst>
-              <a:ext uri="{FF2B5EF4-FFF2-40B4-BE49-F238E27FC236}">
-                <a16:creationId xmlns:a16="http://schemas.microsoft.com/office/drawing/2014/main" id="{50222A95-81D9-46EC-8915-69C567B54508}"/>
-              </a:ext>
-            </a:extLst>
-          </p:cNvPr>
-          <p:cNvSpPr txBox="1"/>
-          <p:nvPr/>
-        </p:nvSpPr>
-        <p:spPr>
-          <a:xfrm>
-            <a:off x="4976192" y="5933168"/>
-            <a:ext cx="301686" cy="369332"/>
-          </a:xfrm>
-          <a:prstGeom prst="rect">
-            <a:avLst/>
-          </a:prstGeom>
-          <a:noFill/>
-        </p:spPr>
-        <p:txBody>
-          <a:bodyPr wrap="none" rtlCol="0">
-            <a:spAutoFit/>
-          </a:bodyPr>
-          <a:lstStyle/>
-          <a:p>
-            <a:r>
-              <a:rPr lang="it-IT" dirty="0"/>
-              <a:t>4</a:t>
-            </a:r>
+            <a:endParaRPr lang="it-IT" dirty="0"/>
           </a:p>
         </p:txBody>
       </p:sp>
     </p:spTree>
     <p:extLst>
       <p:ext uri="{BB962C8B-B14F-4D97-AF65-F5344CB8AC3E}">
-        <p14:creationId xmlns:p14="http://schemas.microsoft.com/office/powerpoint/2010/main" val="2429441109"/>
+        <p14:creationId xmlns:p14="http://schemas.microsoft.com/office/powerpoint/2010/main" val="895157003"/>
       </p:ext>
     </p:extLst>
   </p:cSld>
@@ -30035,7 +30201,7 @@
           <a:p>
             <a:r>
               <a:rPr lang="it-IT" b="1"/>
-              <a:t>Algoritmo informale</a:t>
+              <a:t>Algoritmo formale</a:t>
             </a:r>
           </a:p>
         </p:txBody>
@@ -30059,78 +30225,527 @@
         <p:spPr/>
         <p:txBody>
           <a:bodyPr>
-            <a:normAutofit/>
+            <a:normAutofit fontScale="62500" lnSpcReduction="20000"/>
           </a:bodyPr>
           <a:lstStyle/>
           <a:p>
-            <a:pPr>
+            <a:pPr marL="0" indent="0">
               <a:lnSpc>
-                <a:spcPct val="107000"/>
+                <a:spcPct val="50000"/>
               </a:lnSpc>
-              <a:spcAft>
-                <a:spcPts val="800"/>
-              </a:spcAft>
+              <a:buNone/>
             </a:pPr>
             <a:r>
-              <a:rPr lang="it-IT"/>
-              <a:t>ogni processo tiene traccia del suo livello (e di quello degli altri), e di un valore “key”.</a:t>
+              <a:rPr lang="it-IT" sz="2200" dirty="0" err="1"/>
+              <a:t>states</a:t>
+            </a:r>
+            <a:r>
+              <a:rPr lang="it-IT" sz="2200" dirty="0"/>
+              <a:t>:</a:t>
             </a:r>
           </a:p>
           <a:p>
-            <a:pPr>
+            <a:pPr marL="0" indent="0">
               <a:lnSpc>
-                <a:spcPct val="107000"/>
+                <a:spcPct val="50000"/>
               </a:lnSpc>
-              <a:spcAft>
-                <a:spcPts val="800"/>
-              </a:spcAft>
+              <a:buNone/>
             </a:pPr>
             <a:r>
-              <a:rPr lang="it-IT"/>
-              <a:t>Ogni nodo tiene traccia di tutti i valori di decisione iniziali degli altri nodi.</a:t>
+              <a:rPr lang="it-IT" sz="2200" dirty="0"/>
+              <a:t>rounds = 0</a:t>
             </a:r>
           </a:p>
           <a:p>
-            <a:pPr>
+            <a:pPr marL="0" indent="0">
               <a:lnSpc>
-                <a:spcPct val="107000"/>
+                <a:spcPct val="50000"/>
               </a:lnSpc>
-              <a:spcAft>
-                <a:spcPts val="800"/>
-              </a:spcAft>
+              <a:buNone/>
             </a:pPr>
             <a:r>
-              <a:rPr lang="it-IT"/>
-              <a:t>key è un intero compreso tra 1 ed r, deciso dal processo n°1</a:t>
+              <a:rPr lang="it-IT" sz="2200" dirty="0" err="1"/>
+              <a:t>decision</a:t>
+            </a:r>
+            <a:r>
+              <a:rPr lang="it-IT" sz="2200" dirty="0"/>
+              <a:t> = </a:t>
+            </a:r>
+            <a:r>
+              <a:rPr lang="it-IT" sz="2200" dirty="0" err="1"/>
+              <a:t>unknown</a:t>
+            </a:r>
+            <a:r>
+              <a:rPr lang="it-IT" sz="2200" dirty="0"/>
+              <a:t>. Può essere: {</a:t>
+            </a:r>
+            <a:r>
+              <a:rPr lang="it-IT" sz="2200" dirty="0" err="1"/>
+              <a:t>unknown</a:t>
+            </a:r>
+            <a:r>
+              <a:rPr lang="it-IT" sz="2200" dirty="0"/>
+              <a:t>, 0, 1}</a:t>
             </a:r>
           </a:p>
           <a:p>
-            <a:pPr>
+            <a:pPr marL="0" indent="0">
               <a:lnSpc>
-                <a:spcPct val="107000"/>
+                <a:spcPct val="50000"/>
               </a:lnSpc>
-              <a:spcAft>
-                <a:spcPts val="800"/>
-              </a:spcAft>
+              <a:buNone/>
             </a:pPr>
             <a:r>
-              <a:rPr lang="it-IT"/>
-              <a:t>Key, value e level sono diffusi tra un nodo e l’altro, piggybacked nei messaggi</a:t>
+              <a:rPr lang="it-IT" sz="2200" dirty="0"/>
+              <a:t>key = </a:t>
+            </a:r>
+            <a:r>
+              <a:rPr lang="it-IT" sz="2200" dirty="0" err="1"/>
+              <a:t>undefined</a:t>
+            </a:r>
+            <a:r>
+              <a:rPr lang="it-IT" sz="2200" dirty="0"/>
+              <a:t> se il processo  i  non è il processo n°1, un valore random tra [1,r] altrimenti</a:t>
             </a:r>
           </a:p>
           <a:p>
-            <a:pPr>
+            <a:pPr marL="0" indent="0">
               <a:lnSpc>
-                <a:spcPct val="107000"/>
+                <a:spcPct val="50000"/>
               </a:lnSpc>
-              <a:spcAft>
-                <a:spcPts val="800"/>
-              </a:spcAft>
+              <a:buNone/>
             </a:pPr>
             <a:r>
-              <a:rPr lang="it-IT"/>
-              <a:t>Dopo r  round ogni processo decide 1 se e solo se il suo livello è &gt;= al valore key e tutti gli initial values dei nodi sono = 1 </a:t>
+              <a:rPr lang="it-IT" sz="2200" dirty="0" err="1"/>
+              <a:t>level</a:t>
             </a:r>
+            <a:r>
+              <a:rPr lang="it-IT" sz="2200" dirty="0"/>
+              <a:t>. Un vettore contenente il livello a cui si trova ogni processo. </a:t>
+            </a:r>
+            <a:r>
+              <a:rPr lang="it-IT" sz="2200" dirty="0" err="1"/>
+              <a:t>Inizalmente</a:t>
+            </a:r>
+            <a:r>
+              <a:rPr lang="it-IT" sz="2200" dirty="0"/>
+              <a:t> </a:t>
+            </a:r>
+            <a:r>
+              <a:rPr lang="it-IT" sz="2200" dirty="0" err="1"/>
+              <a:t>level</a:t>
+            </a:r>
+            <a:r>
+              <a:rPr lang="it-IT" sz="2200" dirty="0"/>
+              <a:t>(i) = 0, tutti gli altri valori = -1</a:t>
+            </a:r>
+          </a:p>
+          <a:p>
+            <a:pPr marL="0" indent="0">
+              <a:lnSpc>
+                <a:spcPct val="50000"/>
+              </a:lnSpc>
+              <a:buNone/>
+            </a:pPr>
+            <a:r>
+              <a:rPr lang="it-IT" sz="2200" dirty="0" err="1"/>
+              <a:t>value</a:t>
+            </a:r>
+            <a:r>
+              <a:rPr lang="it-IT" sz="2200" dirty="0"/>
+              <a:t>. Un vettore contenente i valori iniziali di ogni processo. </a:t>
+            </a:r>
+            <a:r>
+              <a:rPr lang="it-IT" sz="2200" dirty="0" err="1"/>
+              <a:t>Inizalmente</a:t>
+            </a:r>
+            <a:r>
+              <a:rPr lang="it-IT" sz="2200" dirty="0"/>
+              <a:t> </a:t>
+            </a:r>
+            <a:r>
+              <a:rPr lang="it-IT" sz="2200" dirty="0" err="1"/>
+              <a:t>value</a:t>
+            </a:r>
+            <a:r>
+              <a:rPr lang="it-IT" sz="2200" dirty="0"/>
+              <a:t>(i) = valore iniziale di i, tutti gli altri valori = </a:t>
+            </a:r>
+            <a:r>
+              <a:rPr lang="it-IT" sz="2200" dirty="0" err="1"/>
+              <a:t>undefined</a:t>
+            </a:r>
+            <a:endParaRPr lang="it-IT" sz="2200" dirty="0"/>
+          </a:p>
+          <a:p>
+            <a:pPr marL="0" indent="0">
+              <a:lnSpc>
+                <a:spcPct val="50000"/>
+              </a:lnSpc>
+              <a:buNone/>
+            </a:pPr>
+            <a:endParaRPr lang="it-IT" sz="2200" dirty="0"/>
+          </a:p>
+          <a:p>
+            <a:pPr marL="0" indent="0">
+              <a:lnSpc>
+                <a:spcPct val="50000"/>
+              </a:lnSpc>
+              <a:buNone/>
+            </a:pPr>
+            <a:r>
+              <a:rPr lang="it-IT" sz="2200" dirty="0" err="1"/>
+              <a:t>msgsi</a:t>
+            </a:r>
+            <a:r>
+              <a:rPr lang="it-IT" sz="2200" dirty="0"/>
+              <a:t>:</a:t>
+            </a:r>
+          </a:p>
+          <a:p>
+            <a:pPr marL="0" indent="0">
+              <a:lnSpc>
+                <a:spcPct val="50000"/>
+              </a:lnSpc>
+              <a:buNone/>
+            </a:pPr>
+            <a:r>
+              <a:rPr lang="it-IT" sz="2200" dirty="0"/>
+              <a:t>	</a:t>
+            </a:r>
+            <a:r>
+              <a:rPr lang="it-IT" sz="2200" dirty="0" err="1"/>
+              <a:t>message</a:t>
+            </a:r>
+            <a:r>
+              <a:rPr lang="it-IT" sz="2200" dirty="0"/>
+              <a:t> = (L, V ,K) inviato a tutti i nodi, dove L è il vettore </a:t>
+            </a:r>
+            <a:r>
+              <a:rPr lang="it-IT" sz="2200" dirty="0" err="1"/>
+              <a:t>level</a:t>
+            </a:r>
+            <a:r>
+              <a:rPr lang="it-IT" sz="2200" dirty="0"/>
+              <a:t> e V il vettore </a:t>
+            </a:r>
+            <a:r>
+              <a:rPr lang="it-IT" sz="2200" dirty="0" err="1"/>
+              <a:t>value</a:t>
+            </a:r>
+            <a:r>
+              <a:rPr lang="it-IT" sz="2200" dirty="0"/>
+              <a:t>, K è la key</a:t>
+            </a:r>
+          </a:p>
+          <a:p>
+            <a:pPr marL="0" indent="0">
+              <a:lnSpc>
+                <a:spcPct val="50000"/>
+              </a:lnSpc>
+              <a:buNone/>
+            </a:pPr>
+            <a:r>
+              <a:rPr lang="it-IT" sz="2200" dirty="0"/>
+              <a:t>transi:</a:t>
+            </a:r>
+          </a:p>
+          <a:p>
+            <a:pPr marL="457200" lvl="1" indent="0">
+              <a:lnSpc>
+                <a:spcPct val="50000"/>
+              </a:lnSpc>
+              <a:buNone/>
+            </a:pPr>
+            <a:r>
+              <a:rPr lang="it-IT" sz="2200" dirty="0"/>
+              <a:t>rounds := rounds + 1</a:t>
+            </a:r>
+          </a:p>
+          <a:p>
+            <a:pPr marL="457200" lvl="1" indent="0">
+              <a:lnSpc>
+                <a:spcPct val="50000"/>
+              </a:lnSpc>
+              <a:buNone/>
+            </a:pPr>
+            <a:r>
+              <a:rPr lang="it-IT" sz="2200" dirty="0" err="1"/>
+              <a:t>If</a:t>
+            </a:r>
+            <a:r>
+              <a:rPr lang="it-IT" sz="2200" dirty="0"/>
+              <a:t> K != </a:t>
+            </a:r>
+            <a:r>
+              <a:rPr lang="it-IT" sz="2200" dirty="0" err="1"/>
+              <a:t>undefined</a:t>
+            </a:r>
+            <a:r>
+              <a:rPr lang="it-IT" sz="2200" dirty="0"/>
+              <a:t> key=K  </a:t>
+            </a:r>
+          </a:p>
+          <a:p>
+            <a:pPr marL="457200" lvl="1" indent="0">
+              <a:lnSpc>
+                <a:spcPct val="50000"/>
+              </a:lnSpc>
+              <a:buNone/>
+            </a:pPr>
+            <a:r>
+              <a:rPr lang="it-IT" sz="2200" dirty="0" err="1"/>
+              <a:t>Foreach</a:t>
+            </a:r>
+            <a:r>
+              <a:rPr lang="it-IT" sz="2200" dirty="0"/>
+              <a:t> </a:t>
+            </a:r>
+            <a:r>
+              <a:rPr lang="it-IT" sz="2200" dirty="0" err="1"/>
+              <a:t>message</a:t>
+            </a:r>
+            <a:r>
+              <a:rPr lang="it-IT" sz="2200" dirty="0"/>
+              <a:t> do</a:t>
+            </a:r>
+          </a:p>
+          <a:p>
+            <a:pPr marL="457200" lvl="1" indent="0">
+              <a:lnSpc>
+                <a:spcPct val="50000"/>
+              </a:lnSpc>
+              <a:buNone/>
+            </a:pPr>
+            <a:r>
+              <a:rPr lang="it-IT" sz="2200" dirty="0"/>
+              <a:t>	for j != i</a:t>
+            </a:r>
+          </a:p>
+          <a:p>
+            <a:pPr marL="457200" lvl="1" indent="0">
+              <a:lnSpc>
+                <a:spcPct val="50000"/>
+              </a:lnSpc>
+              <a:buNone/>
+            </a:pPr>
+            <a:r>
+              <a:rPr lang="it-IT" sz="2200" dirty="0"/>
+              <a:t>	        </a:t>
+            </a:r>
+            <a:r>
+              <a:rPr lang="it-IT" sz="2200" dirty="0" err="1"/>
+              <a:t>value</a:t>
+            </a:r>
+            <a:r>
+              <a:rPr lang="it-IT" sz="2200" dirty="0"/>
+              <a:t>(j) == </a:t>
+            </a:r>
+            <a:r>
+              <a:rPr lang="it-IT" sz="2200" dirty="0" err="1"/>
+              <a:t>undefined</a:t>
+            </a:r>
+            <a:r>
+              <a:rPr lang="it-IT" sz="2200" dirty="0"/>
+              <a:t> </a:t>
+            </a:r>
+            <a:r>
+              <a:rPr lang="it-IT" sz="2200" dirty="0" err="1"/>
+              <a:t>then</a:t>
+            </a:r>
+            <a:r>
+              <a:rPr lang="it-IT" sz="2200" dirty="0"/>
+              <a:t> val( j ) := V( j )</a:t>
+            </a:r>
+          </a:p>
+          <a:p>
+            <a:pPr marL="457200" lvl="1" indent="0">
+              <a:lnSpc>
+                <a:spcPct val="50000"/>
+              </a:lnSpc>
+              <a:buNone/>
+            </a:pPr>
+            <a:r>
+              <a:rPr lang="it-IT" sz="2200" dirty="0"/>
+              <a:t>	        </a:t>
+            </a:r>
+            <a:r>
+              <a:rPr lang="it-IT" sz="2200" dirty="0" err="1"/>
+              <a:t>if</a:t>
+            </a:r>
+            <a:r>
+              <a:rPr lang="it-IT" sz="2200" dirty="0"/>
+              <a:t> L( j ) &gt; </a:t>
+            </a:r>
+            <a:r>
+              <a:rPr lang="it-IT" sz="2200" dirty="0" err="1"/>
+              <a:t>level</a:t>
+            </a:r>
+            <a:r>
+              <a:rPr lang="it-IT" sz="2200" dirty="0"/>
+              <a:t>( j ) </a:t>
+            </a:r>
+            <a:r>
+              <a:rPr lang="it-IT" sz="2200" dirty="0" err="1"/>
+              <a:t>then</a:t>
+            </a:r>
+            <a:r>
+              <a:rPr lang="it-IT" sz="2200" dirty="0"/>
+              <a:t> </a:t>
+            </a:r>
+            <a:r>
+              <a:rPr lang="it-IT" sz="2200" dirty="0" err="1"/>
+              <a:t>level</a:t>
+            </a:r>
+            <a:r>
+              <a:rPr lang="it-IT" sz="2200" dirty="0"/>
+              <a:t>( j ):= L( j )</a:t>
+            </a:r>
+          </a:p>
+          <a:p>
+            <a:pPr marL="457200" lvl="1" indent="0">
+              <a:lnSpc>
+                <a:spcPct val="50000"/>
+              </a:lnSpc>
+              <a:buNone/>
+            </a:pPr>
+            <a:r>
+              <a:rPr lang="it-IT" sz="2200" dirty="0" err="1"/>
+              <a:t>level</a:t>
+            </a:r>
+            <a:r>
+              <a:rPr lang="it-IT" sz="2200" dirty="0"/>
+              <a:t>(i) := 1 + min {</a:t>
+            </a:r>
+            <a:r>
+              <a:rPr lang="it-IT" sz="2200" dirty="0" err="1"/>
+              <a:t>level</a:t>
+            </a:r>
+            <a:r>
+              <a:rPr lang="it-IT" sz="2200" dirty="0"/>
+              <a:t>(j): j != i}</a:t>
+            </a:r>
+          </a:p>
+          <a:p>
+            <a:pPr marL="457200" lvl="1" indent="0">
+              <a:lnSpc>
+                <a:spcPct val="50000"/>
+              </a:lnSpc>
+              <a:buNone/>
+            </a:pPr>
+            <a:r>
+              <a:rPr lang="it-IT" sz="2200" dirty="0" err="1"/>
+              <a:t>if</a:t>
+            </a:r>
+            <a:r>
+              <a:rPr lang="it-IT" sz="2200" dirty="0"/>
+              <a:t> rounds = r </a:t>
+            </a:r>
+            <a:r>
+              <a:rPr lang="it-IT" sz="2200" dirty="0" err="1"/>
+              <a:t>then</a:t>
+            </a:r>
+            <a:endParaRPr lang="it-IT" sz="2200" dirty="0"/>
+          </a:p>
+          <a:p>
+            <a:pPr marL="457200" lvl="1" indent="0">
+              <a:lnSpc>
+                <a:spcPct val="50000"/>
+              </a:lnSpc>
+              <a:buNone/>
+            </a:pPr>
+            <a:r>
+              <a:rPr lang="it-IT" sz="2200" dirty="0"/>
+              <a:t>	</a:t>
+            </a:r>
+            <a:r>
+              <a:rPr lang="it-IT" sz="2200" dirty="0" err="1"/>
+              <a:t>if</a:t>
+            </a:r>
+            <a:r>
+              <a:rPr lang="it-IT" sz="2200" dirty="0"/>
+              <a:t> key != </a:t>
+            </a:r>
+            <a:r>
+              <a:rPr lang="it-IT" sz="2200" dirty="0" err="1"/>
+              <a:t>undefined</a:t>
+            </a:r>
+            <a:r>
+              <a:rPr lang="it-IT" sz="2200" dirty="0"/>
+              <a:t> and </a:t>
+            </a:r>
+            <a:r>
+              <a:rPr lang="it-IT" sz="2200" dirty="0" err="1"/>
+              <a:t>level</a:t>
+            </a:r>
+            <a:r>
+              <a:rPr lang="it-IT" sz="2200" dirty="0"/>
+              <a:t>(i) &gt;= key and val(j) = 1 for </a:t>
+            </a:r>
+            <a:r>
+              <a:rPr lang="it-IT" sz="2200" dirty="0" err="1"/>
+              <a:t>all</a:t>
+            </a:r>
+            <a:r>
+              <a:rPr lang="it-IT" sz="2200" dirty="0"/>
+              <a:t> </a:t>
+            </a:r>
+            <a:r>
+              <a:rPr lang="it-IT" sz="2200" dirty="0" err="1"/>
+              <a:t>then</a:t>
+            </a:r>
+            <a:endParaRPr lang="it-IT" sz="2200" dirty="0"/>
+          </a:p>
+          <a:p>
+            <a:pPr marL="457200" lvl="1" indent="0">
+              <a:lnSpc>
+                <a:spcPct val="50000"/>
+              </a:lnSpc>
+              <a:buNone/>
+            </a:pPr>
+            <a:r>
+              <a:rPr lang="it-IT" sz="2200" dirty="0"/>
+              <a:t>		</a:t>
+            </a:r>
+            <a:r>
+              <a:rPr lang="it-IT" sz="2200" dirty="0" err="1"/>
+              <a:t>decision</a:t>
+            </a:r>
+            <a:r>
+              <a:rPr lang="it-IT" sz="2200" dirty="0"/>
+              <a:t> := 1	</a:t>
+            </a:r>
+          </a:p>
+          <a:p>
+            <a:pPr marL="457200" lvl="1" indent="0">
+              <a:lnSpc>
+                <a:spcPct val="50000"/>
+              </a:lnSpc>
+              <a:buNone/>
+            </a:pPr>
+            <a:r>
+              <a:rPr lang="it-IT" sz="2200" dirty="0"/>
+              <a:t>	else </a:t>
+            </a:r>
+            <a:r>
+              <a:rPr lang="it-IT" sz="2200" dirty="0" err="1"/>
+              <a:t>decision</a:t>
+            </a:r>
+            <a:r>
+              <a:rPr lang="it-IT" sz="2200" dirty="0"/>
+              <a:t> := 0</a:t>
+            </a:r>
+          </a:p>
+          <a:p>
+            <a:pPr marL="0" indent="0">
+              <a:lnSpc>
+                <a:spcPct val="50000"/>
+              </a:lnSpc>
+              <a:buNone/>
+            </a:pPr>
+            <a:endParaRPr lang="it-IT" sz="1400" dirty="0"/>
+          </a:p>
+          <a:p>
             <a:endParaRPr lang="it-IT" dirty="0"/>
           </a:p>
         </p:txBody>
@@ -30138,7 +30753,7 @@
     </p:spTree>
     <p:extLst>
       <p:ext uri="{BB962C8B-B14F-4D97-AF65-F5344CB8AC3E}">
-        <p14:creationId xmlns:p14="http://schemas.microsoft.com/office/powerpoint/2010/main" val="895157003"/>
+        <p14:creationId xmlns:p14="http://schemas.microsoft.com/office/powerpoint/2010/main" val="201992648"/>
       </p:ext>
     </p:extLst>
   </p:cSld>
@@ -30183,305 +30798,179 @@
         </p:nvSpPr>
         <p:spPr/>
         <p:txBody>
-          <a:bodyPr/>
+          <a:bodyPr>
+            <a:normAutofit/>
+          </a:bodyPr>
           <a:lstStyle/>
           <a:p>
             <a:r>
               <a:rPr lang="it-IT" b="1"/>
-              <a:t>Algoritmo formale</a:t>
+              <a:t>Teorema algoritmo </a:t>
             </a:r>
+            <a:r>
+              <a:rPr lang="it-IT" b="1" err="1"/>
+              <a:t>RandomAttack</a:t>
+            </a:r>
+            <a:endParaRPr lang="it-IT" b="1"/>
           </a:p>
         </p:txBody>
       </p:sp>
-      <p:sp>
-        <p:nvSpPr>
-          <p:cNvPr id="3" name="Segnaposto contenuto 2">
-            <a:extLst>
-              <a:ext uri="{FF2B5EF4-FFF2-40B4-BE49-F238E27FC236}">
-                <a16:creationId xmlns:a16="http://schemas.microsoft.com/office/drawing/2014/main" id="{B9F53D77-5544-41E6-8348-5265EDE4CAE1}"/>
-              </a:ext>
-            </a:extLst>
-          </p:cNvPr>
-          <p:cNvSpPr>
-            <a:spLocks noGrp="1"/>
-          </p:cNvSpPr>
-          <p:nvPr>
-            <p:ph idx="1"/>
-          </p:nvPr>
-        </p:nvSpPr>
-        <p:spPr/>
-        <p:txBody>
-          <a:bodyPr>
-            <a:normAutofit fontScale="62500" lnSpcReduction="20000"/>
-          </a:bodyPr>
-          <a:lstStyle/>
-          <a:p>
-            <a:pPr marL="0" indent="0">
-              <a:lnSpc>
-                <a:spcPct val="50000"/>
-              </a:lnSpc>
-              <a:buNone/>
-            </a:pPr>
-            <a:r>
-              <a:rPr lang="it-IT" sz="2200"/>
-              <a:t>states:</a:t>
-            </a:r>
-          </a:p>
-          <a:p>
-            <a:pPr marL="0" indent="0">
-              <a:lnSpc>
-                <a:spcPct val="50000"/>
-              </a:lnSpc>
-              <a:buNone/>
-            </a:pPr>
-            <a:r>
-              <a:rPr lang="it-IT" sz="2200"/>
-              <a:t>rounds = 0</a:t>
-            </a:r>
-          </a:p>
-          <a:p>
-            <a:pPr marL="0" indent="0">
-              <a:lnSpc>
-                <a:spcPct val="50000"/>
-              </a:lnSpc>
-              <a:buNone/>
-            </a:pPr>
-            <a:r>
-              <a:rPr lang="it-IT" sz="2200"/>
-              <a:t>decision = unknown. Può essere: {unknown, 0, 1}</a:t>
-            </a:r>
-          </a:p>
-          <a:p>
-            <a:pPr marL="0" indent="0">
-              <a:lnSpc>
-                <a:spcPct val="50000"/>
-              </a:lnSpc>
-              <a:buNone/>
-            </a:pPr>
-            <a:r>
-              <a:rPr lang="it-IT" sz="2200"/>
-              <a:t>key = undefined se il processo  i  non è il processo n°1, un valore random tra [1,r] altrimenti</a:t>
-            </a:r>
-          </a:p>
-          <a:p>
-            <a:pPr marL="0" indent="0">
-              <a:lnSpc>
-                <a:spcPct val="50000"/>
-              </a:lnSpc>
-              <a:buNone/>
-            </a:pPr>
-            <a:r>
-              <a:rPr lang="it-IT" sz="2200"/>
-              <a:t>level. Un vettore contenente il livello a cui si trova ogni processo. Inizalmente level(i) = 0, tutti gli altri valori = -1</a:t>
-            </a:r>
-          </a:p>
-          <a:p>
-            <a:pPr marL="0" indent="0">
-              <a:lnSpc>
-                <a:spcPct val="50000"/>
-              </a:lnSpc>
-              <a:buNone/>
-            </a:pPr>
-            <a:r>
-              <a:rPr lang="it-IT" sz="2200"/>
-              <a:t>value. Un vettore contenente i valori iniziali di ogni processo. Inizalmente value(i) = valore iniziale di i, tutti gli altri valori = undefined</a:t>
-            </a:r>
-          </a:p>
-          <a:p>
-            <a:pPr marL="0" indent="0">
-              <a:lnSpc>
-                <a:spcPct val="50000"/>
-              </a:lnSpc>
-              <a:buNone/>
-            </a:pPr>
-            <a:endParaRPr lang="it-IT" sz="2200"/>
-          </a:p>
-          <a:p>
-            <a:pPr marL="0" indent="0">
-              <a:lnSpc>
-                <a:spcPct val="50000"/>
-              </a:lnSpc>
-              <a:buNone/>
-            </a:pPr>
-            <a:r>
-              <a:rPr lang="it-IT" sz="2200"/>
-              <a:t>msgsi:</a:t>
-            </a:r>
-          </a:p>
-          <a:p>
-            <a:pPr marL="0" indent="0">
-              <a:lnSpc>
-                <a:spcPct val="50000"/>
-              </a:lnSpc>
-              <a:buNone/>
-            </a:pPr>
-            <a:r>
-              <a:rPr lang="it-IT" sz="2200"/>
-              <a:t>	message = (L, V ,K) inviato a tutti i nodi, dove L è il vettore level e V il vettore value, K è la key</a:t>
-            </a:r>
-          </a:p>
-          <a:p>
-            <a:pPr marL="0" indent="0">
-              <a:lnSpc>
-                <a:spcPct val="50000"/>
-              </a:lnSpc>
-              <a:buNone/>
-            </a:pPr>
-            <a:r>
-              <a:rPr lang="it-IT" sz="2200"/>
-              <a:t>transi:</a:t>
-            </a:r>
-          </a:p>
-          <a:p>
-            <a:pPr marL="457200" lvl="1" indent="0">
-              <a:lnSpc>
-                <a:spcPct val="50000"/>
-              </a:lnSpc>
-              <a:buNone/>
-            </a:pPr>
-            <a:r>
-              <a:rPr lang="it-IT" sz="2200"/>
-              <a:t>rounds := rounds + 1</a:t>
-            </a:r>
-          </a:p>
-          <a:p>
-            <a:pPr marL="457200" lvl="1" indent="0">
-              <a:lnSpc>
-                <a:spcPct val="50000"/>
-              </a:lnSpc>
-              <a:buNone/>
-            </a:pPr>
-            <a:r>
-              <a:rPr lang="it-IT" sz="2200"/>
-              <a:t>If K != undefined key=K #se la chiave te l’ha detta qualcuno che la sa te la salvi</a:t>
-            </a:r>
-          </a:p>
-          <a:p>
-            <a:pPr marL="457200" lvl="1" indent="0">
-              <a:lnSpc>
-                <a:spcPct val="50000"/>
-              </a:lnSpc>
-              <a:buNone/>
-            </a:pPr>
-            <a:r>
-              <a:rPr lang="it-IT" sz="2200"/>
-              <a:t>Foreach message do</a:t>
-            </a:r>
-          </a:p>
-          <a:p>
-            <a:pPr marL="457200" lvl="1" indent="0">
-              <a:lnSpc>
-                <a:spcPct val="50000"/>
-              </a:lnSpc>
-              <a:buNone/>
-            </a:pPr>
-            <a:r>
-              <a:rPr lang="it-IT" sz="2200"/>
-              <a:t>	for j != i</a:t>
-            </a:r>
-          </a:p>
-          <a:p>
-            <a:pPr marL="457200" lvl="1" indent="0">
-              <a:lnSpc>
-                <a:spcPct val="50000"/>
-              </a:lnSpc>
-              <a:buNone/>
-            </a:pPr>
-            <a:r>
-              <a:rPr lang="it-IT" sz="2200"/>
-              <a:t>	        value(j) == undefined then val( j ) := V( j )</a:t>
-            </a:r>
-          </a:p>
-          <a:p>
-            <a:pPr marL="457200" lvl="1" indent="0">
-              <a:lnSpc>
-                <a:spcPct val="50000"/>
-              </a:lnSpc>
-              <a:buNone/>
-            </a:pPr>
-            <a:r>
-              <a:rPr lang="it-IT" sz="2200"/>
-              <a:t>	        if L( j ) &gt; level( j ) then level( j ):= L( j )</a:t>
-            </a:r>
-          </a:p>
-          <a:p>
-            <a:pPr marL="457200" lvl="1" indent="0">
-              <a:lnSpc>
-                <a:spcPct val="50000"/>
-              </a:lnSpc>
-              <a:buNone/>
-            </a:pPr>
-            <a:r>
-              <a:rPr lang="it-IT" sz="2200"/>
-              <a:t>level(i) := 1 + min {level(j): j != i}</a:t>
-            </a:r>
-          </a:p>
-          <a:p>
-            <a:pPr marL="457200" lvl="1" indent="0">
-              <a:lnSpc>
-                <a:spcPct val="50000"/>
-              </a:lnSpc>
-              <a:buNone/>
-            </a:pPr>
-            <a:r>
-              <a:rPr lang="it-IT" sz="2200"/>
-              <a:t>if rounds = r then</a:t>
-            </a:r>
-          </a:p>
-          <a:p>
-            <a:pPr marL="457200" lvl="1" indent="0">
-              <a:lnSpc>
-                <a:spcPct val="50000"/>
-              </a:lnSpc>
-              <a:buNone/>
-            </a:pPr>
-            <a:r>
-              <a:rPr lang="it-IT" sz="2200"/>
-              <a:t>	if key != undefined and level(i) &gt;= key and val(j) = 1 for all then</a:t>
-            </a:r>
-          </a:p>
-          <a:p>
-            <a:pPr marL="457200" lvl="1" indent="0">
-              <a:lnSpc>
-                <a:spcPct val="50000"/>
-              </a:lnSpc>
-              <a:buNone/>
-            </a:pPr>
-            <a:r>
-              <a:rPr lang="it-IT" sz="2200"/>
-              <a:t>		decision := 1	</a:t>
-            </a:r>
-          </a:p>
-          <a:p>
-            <a:pPr marL="457200" lvl="1" indent="0">
-              <a:lnSpc>
-                <a:spcPct val="50000"/>
-              </a:lnSpc>
-              <a:buNone/>
-            </a:pPr>
-            <a:r>
-              <a:rPr lang="it-IT" sz="2200"/>
-              <a:t>	else decision := 0</a:t>
-            </a:r>
-          </a:p>
-          <a:p>
-            <a:pPr marL="0" indent="0">
-              <a:lnSpc>
-                <a:spcPct val="50000"/>
-              </a:lnSpc>
-              <a:buNone/>
-            </a:pPr>
-            <a:endParaRPr lang="it-IT" sz="1400"/>
-          </a:p>
-          <a:p>
-            <a:endParaRPr lang="it-IT"/>
-          </a:p>
-        </p:txBody>
-      </p:sp>
+      <mc:AlternateContent xmlns:mc="http://schemas.openxmlformats.org/markup-compatibility/2006" xmlns:a14="http://schemas.microsoft.com/office/drawing/2010/main">
+        <mc:Choice Requires="a14">
+          <p:sp>
+            <p:nvSpPr>
+              <p:cNvPr id="3" name="Segnaposto contenuto 2">
+                <a:extLst>
+                  <a:ext uri="{FF2B5EF4-FFF2-40B4-BE49-F238E27FC236}">
+                    <a16:creationId xmlns:a16="http://schemas.microsoft.com/office/drawing/2014/main" id="{B9F53D77-5544-41E6-8348-5265EDE4CAE1}"/>
+                  </a:ext>
+                </a:extLst>
+              </p:cNvPr>
+              <p:cNvSpPr>
+                <a:spLocks noGrp="1"/>
+              </p:cNvSpPr>
+              <p:nvPr>
+                <p:ph idx="1"/>
+              </p:nvPr>
+            </p:nvSpPr>
+            <p:spPr/>
+            <p:txBody>
+              <a:bodyPr/>
+              <a:lstStyle/>
+              <a:p>
+                <a:pPr>
+                  <a:lnSpc>
+                    <a:spcPct val="107000"/>
+                  </a:lnSpc>
+                  <a:spcAft>
+                    <a:spcPts val="800"/>
+                  </a:spcAft>
+                </a:pPr>
+                <a:r>
+                  <a:rPr lang="it-IT" dirty="0"/>
+                  <a:t>L'Algoritmo del </a:t>
+                </a:r>
+                <a:r>
+                  <a:rPr lang="it-IT" dirty="0" err="1"/>
+                  <a:t>RandomAttack</a:t>
+                </a:r>
+                <a:r>
+                  <a:rPr lang="it-IT" dirty="0"/>
+                  <a:t> risolve la versione randomizzata del problema dell’attacco coordinato (versione randomica)  con un </a:t>
+                </a:r>
+                <a14:m>
+                  <m:oMath xmlns:m="http://schemas.openxmlformats.org/officeDocument/2006/math">
+                    <m:r>
+                      <a:rPr lang="it-IT" i="1" dirty="0" smtClean="0">
+                        <a:latin typeface="Cambria Math" panose="02040503050406030204" pitchFamily="18" charset="0"/>
+                      </a:rPr>
+                      <m:t>𝜖</m:t>
+                    </m:r>
+                    <m:r>
+                      <a:rPr lang="it-IT" i="1" dirty="0" smtClean="0">
+                        <a:latin typeface="Cambria Math" panose="02040503050406030204" pitchFamily="18" charset="0"/>
+                      </a:rPr>
+                      <m:t> = </m:t>
+                    </m:r>
+                    <m:f>
+                      <m:fPr>
+                        <m:ctrlPr>
+                          <a:rPr lang="it-IT" i="1" dirty="0" smtClean="0">
+                            <a:latin typeface="Cambria Math" panose="02040503050406030204" pitchFamily="18" charset="0"/>
+                          </a:rPr>
+                        </m:ctrlPr>
+                      </m:fPr>
+                      <m:num>
+                        <m:r>
+                          <a:rPr lang="it-IT" b="0" i="1" dirty="0" smtClean="0">
+                            <a:latin typeface="Cambria Math" panose="02040503050406030204" pitchFamily="18" charset="0"/>
+                          </a:rPr>
+                          <m:t>1</m:t>
+                        </m:r>
+                      </m:num>
+                      <m:den>
+                        <m:r>
+                          <a:rPr lang="it-IT" b="0" i="1" dirty="0" smtClean="0">
+                            <a:latin typeface="Cambria Math" panose="02040503050406030204" pitchFamily="18" charset="0"/>
+                          </a:rPr>
+                          <m:t>𝑟</m:t>
+                        </m:r>
+                      </m:den>
+                    </m:f>
+                  </m:oMath>
+                </a14:m>
+                <a:r>
+                  <a:rPr lang="it-IT" dirty="0"/>
+                  <a:t> ove r è il numero di round</a:t>
+                </a:r>
+              </a:p>
+              <a:p>
+                <a:pPr marL="0" indent="0">
+                  <a:lnSpc>
+                    <a:spcPct val="107000"/>
+                  </a:lnSpc>
+                  <a:spcAft>
+                    <a:spcPts val="800"/>
+                  </a:spcAft>
+                  <a:buNone/>
+                </a:pPr>
+                <a:endParaRPr lang="it-IT" sz="1800" dirty="0">
+                  <a:effectLst/>
+                  <a:latin typeface="Calibri" panose="020F0502020204030204" pitchFamily="34" charset="0"/>
+                  <a:ea typeface="Calibri" panose="020F0502020204030204" pitchFamily="34" charset="0"/>
+                  <a:cs typeface="Times New Roman" panose="02020603050405020304" pitchFamily="18" charset="0"/>
+                </a:endParaRPr>
+              </a:p>
+              <a:p>
+                <a:endParaRPr lang="it-IT" dirty="0"/>
+              </a:p>
+            </p:txBody>
+          </p:sp>
+        </mc:Choice>
+        <mc:Fallback xmlns="">
+          <p:sp>
+            <p:nvSpPr>
+              <p:cNvPr id="3" name="Segnaposto contenuto 2">
+                <a:extLst>
+                  <a:ext uri="{FF2B5EF4-FFF2-40B4-BE49-F238E27FC236}">
+                    <a16:creationId xmlns:a16="http://schemas.microsoft.com/office/drawing/2014/main" id="{B9F53D77-5544-41E6-8348-5265EDE4CAE1}"/>
+                  </a:ext>
+                </a:extLst>
+              </p:cNvPr>
+              <p:cNvSpPr>
+                <a:spLocks noGrp="1" noRot="1" noChangeAspect="1" noMove="1" noResize="1" noEditPoints="1" noAdjustHandles="1" noChangeArrowheads="1" noChangeShapeType="1" noTextEdit="1"/>
+              </p:cNvSpPr>
+              <p:nvPr>
+                <p:ph idx="1"/>
+              </p:nvPr>
+            </p:nvSpPr>
+            <p:spPr>
+              <a:blipFill>
+                <a:blip r:embed="rId2"/>
+                <a:stretch>
+                  <a:fillRect l="-606" t="-758"/>
+                </a:stretch>
+              </a:blipFill>
+            </p:spPr>
+            <p:txBody>
+              <a:bodyPr/>
+              <a:lstStyle/>
+              <a:p>
+                <a:r>
+                  <a:rPr lang="it-IT">
+                    <a:noFill/>
+                  </a:rPr>
+                  <a:t> </a:t>
+                </a:r>
+              </a:p>
+            </p:txBody>
+          </p:sp>
+        </mc:Fallback>
+      </mc:AlternateContent>
     </p:spTree>
     <p:extLst>
       <p:ext uri="{BB962C8B-B14F-4D97-AF65-F5344CB8AC3E}">
-        <p14:creationId xmlns:p14="http://schemas.microsoft.com/office/powerpoint/2010/main" val="201992648"/>
+        <p14:creationId xmlns:p14="http://schemas.microsoft.com/office/powerpoint/2010/main" val="2016011249"/>
       </p:ext>
     </p:extLst>
   </p:cSld>
@@ -30533,135 +31022,6 @@
           <a:p>
             <a:r>
               <a:rPr lang="it-IT" b="1"/>
-              <a:t>Teorema algoritmo </a:t>
-            </a:r>
-            <a:r>
-              <a:rPr lang="it-IT" b="1" err="1"/>
-              <a:t>RandomAttack</a:t>
-            </a:r>
-            <a:endParaRPr lang="it-IT" b="1"/>
-          </a:p>
-        </p:txBody>
-      </p:sp>
-      <p:sp>
-        <p:nvSpPr>
-          <p:cNvPr id="3" name="Segnaposto contenuto 2">
-            <a:extLst>
-              <a:ext uri="{FF2B5EF4-FFF2-40B4-BE49-F238E27FC236}">
-                <a16:creationId xmlns:a16="http://schemas.microsoft.com/office/drawing/2014/main" id="{B9F53D77-5544-41E6-8348-5265EDE4CAE1}"/>
-              </a:ext>
-            </a:extLst>
-          </p:cNvPr>
-          <p:cNvSpPr>
-            <a:spLocks noGrp="1"/>
-          </p:cNvSpPr>
-          <p:nvPr>
-            <p:ph idx="1"/>
-          </p:nvPr>
-        </p:nvSpPr>
-        <p:spPr/>
-        <p:txBody>
-          <a:bodyPr/>
-          <a:lstStyle/>
-          <a:p>
-            <a:pPr>
-              <a:lnSpc>
-                <a:spcPct val="107000"/>
-              </a:lnSpc>
-              <a:spcAft>
-                <a:spcPts val="800"/>
-              </a:spcAft>
-            </a:pPr>
-            <a:r>
-              <a:rPr lang="it-IT"/>
-              <a:t>L'Algoritmo del </a:t>
-            </a:r>
-            <a:r>
-              <a:rPr lang="it-IT" err="1"/>
-              <a:t>RandomAttack</a:t>
-            </a:r>
-            <a:r>
-              <a:rPr lang="it-IT"/>
-              <a:t> risolve la versione randomizzata del problema dell’attacco coordinato (versione randomica)  con un ϵ = 1/r ove r è il numero di round</a:t>
-            </a:r>
-          </a:p>
-          <a:p>
-            <a:pPr marL="0" indent="0">
-              <a:lnSpc>
-                <a:spcPct val="107000"/>
-              </a:lnSpc>
-              <a:spcAft>
-                <a:spcPts val="800"/>
-              </a:spcAft>
-              <a:buNone/>
-            </a:pPr>
-            <a:endParaRPr lang="it-IT" sz="1800">
-              <a:effectLst/>
-              <a:latin typeface="Calibri" panose="020F0502020204030204" pitchFamily="34" charset="0"/>
-              <a:ea typeface="Calibri" panose="020F0502020204030204" pitchFamily="34" charset="0"/>
-              <a:cs typeface="Times New Roman" panose="02020603050405020304" pitchFamily="18" charset="0"/>
-            </a:endParaRPr>
-          </a:p>
-          <a:p>
-            <a:endParaRPr lang="it-IT"/>
-          </a:p>
-        </p:txBody>
-      </p:sp>
-    </p:spTree>
-    <p:extLst>
-      <p:ext uri="{BB962C8B-B14F-4D97-AF65-F5344CB8AC3E}">
-        <p14:creationId xmlns:p14="http://schemas.microsoft.com/office/powerpoint/2010/main" val="2016011249"/>
-      </p:ext>
-    </p:extLst>
-  </p:cSld>
-  <p:clrMapOvr>
-    <a:masterClrMapping/>
-  </p:clrMapOvr>
-</p:sld>
-</file>
-
-<file path=ppt/slides/slide33.xml><?xml version="1.0" encoding="utf-8"?>
-<p:sld xmlns:a="http://schemas.openxmlformats.org/drawingml/2006/main" xmlns:r="http://schemas.openxmlformats.org/officeDocument/2006/relationships" xmlns:p="http://schemas.openxmlformats.org/presentationml/2006/main">
-  <p:cSld>
-    <p:spTree>
-      <p:nvGrpSpPr>
-        <p:cNvPr id="1" name=""/>
-        <p:cNvGrpSpPr/>
-        <p:nvPr/>
-      </p:nvGrpSpPr>
-      <p:grpSpPr>
-        <a:xfrm>
-          <a:off x="0" y="0"/>
-          <a:ext cx="0" cy="0"/>
-          <a:chOff x="0" y="0"/>
-          <a:chExt cx="0" cy="0"/>
-        </a:xfrm>
-      </p:grpSpPr>
-      <p:sp>
-        <p:nvSpPr>
-          <p:cNvPr id="2" name="Titolo 1">
-            <a:extLst>
-              <a:ext uri="{FF2B5EF4-FFF2-40B4-BE49-F238E27FC236}">
-                <a16:creationId xmlns:a16="http://schemas.microsoft.com/office/drawing/2014/main" id="{4EDD1682-8A20-4872-92A5-6C62A4EF4901}"/>
-              </a:ext>
-            </a:extLst>
-          </p:cNvPr>
-          <p:cNvSpPr>
-            <a:spLocks noGrp="1"/>
-          </p:cNvSpPr>
-          <p:nvPr>
-            <p:ph type="title"/>
-          </p:nvPr>
-        </p:nvSpPr>
-        <p:spPr/>
-        <p:txBody>
-          <a:bodyPr>
-            <a:normAutofit/>
-          </a:bodyPr>
-          <a:lstStyle/>
-          <a:p>
-            <a:r>
-              <a:rPr lang="it-IT" b="1"/>
               <a:t>Dimostrazione informale Teorema algoritmo </a:t>
             </a:r>
             <a:r>
@@ -30672,93 +31032,553 @@
           </a:p>
         </p:txBody>
       </p:sp>
-      <p:sp>
-        <p:nvSpPr>
-          <p:cNvPr id="3" name="Segnaposto contenuto 2">
-            <a:extLst>
-              <a:ext uri="{FF2B5EF4-FFF2-40B4-BE49-F238E27FC236}">
-                <a16:creationId xmlns:a16="http://schemas.microsoft.com/office/drawing/2014/main" id="{B9F53D77-5544-41E6-8348-5265EDE4CAE1}"/>
-              </a:ext>
-            </a:extLst>
-          </p:cNvPr>
-          <p:cNvSpPr>
-            <a:spLocks noGrp="1"/>
-          </p:cNvSpPr>
-          <p:nvPr>
-            <p:ph idx="1"/>
-          </p:nvPr>
-        </p:nvSpPr>
-        <p:spPr/>
-        <p:txBody>
-          <a:bodyPr>
-            <a:normAutofit lnSpcReduction="10000"/>
-          </a:bodyPr>
-          <a:lstStyle/>
-          <a:p>
-            <a:pPr marL="0" indent="0">
-              <a:buNone/>
-            </a:pPr>
-            <a:r>
-              <a:rPr lang="it-IT"/>
-              <a:t>Li = level(i) al round r, quando i deve prendere una decisione</a:t>
-            </a:r>
-          </a:p>
-          <a:p>
-            <a:pPr marL="0" indent="0">
-              <a:buNone/>
-            </a:pPr>
-            <a:endParaRPr lang="it-IT"/>
-          </a:p>
-          <a:p>
-            <a:pPr marL="0" indent="0">
-              <a:buNone/>
-            </a:pPr>
-            <a:r>
-              <a:rPr lang="it-IT"/>
-              <a:t>Se key ≤ min{ li } tutti sono d’accordo perchè tutti hanno superato key</a:t>
-            </a:r>
-          </a:p>
-          <a:p>
-            <a:pPr marL="0" indent="0">
-              <a:buNone/>
-            </a:pPr>
-            <a:r>
-              <a:rPr lang="it-IT"/>
-              <a:t>Se invece key &gt; max{ li } si decide 0 perchè non si è raggiunto il livello necessario.</a:t>
-            </a:r>
-          </a:p>
-          <a:p>
-            <a:pPr marL="0" indent="0">
-              <a:buNone/>
-            </a:pPr>
-            <a:r>
-              <a:rPr lang="it-IT"/>
-              <a:t>L’unica situazione in cui i processi possono essere in disaccordo è quando min{ li } &lt; key ≤ max{ li } cioè quando il valore di level(i) non è lo stesso per tutti i processi e key è più grande del valore più piccolo.</a:t>
-            </a:r>
-          </a:p>
-          <a:p>
-            <a:pPr marL="0" indent="0">
-              <a:buNone/>
-            </a:pPr>
-            <a:r>
-              <a:rPr lang="it-IT"/>
-              <a:t>Ma i diversi li (uno per ogni nodo) si possono distaccare al massimo di 1 per quanto detto nel Lemma 5.2 quindi:</a:t>
-            </a:r>
-          </a:p>
-          <a:p>
-            <a:pPr marL="0" indent="0">
-              <a:buNone/>
-            </a:pPr>
-            <a:r>
-              <a:rPr lang="it-IT"/>
-              <a:t>Dire min{ li } &lt; key ≤ max{ li } è come dire key = max { li }. Dato che key è un valore randomico tra 1 ed r la probabilità che ciò succeda è 1/r</a:t>
-            </a:r>
-          </a:p>
-          <a:p>
-            <a:endParaRPr lang="it-IT"/>
-          </a:p>
-        </p:txBody>
-      </p:sp>
+      <mc:AlternateContent xmlns:mc="http://schemas.openxmlformats.org/markup-compatibility/2006" xmlns:a14="http://schemas.microsoft.com/office/drawing/2010/main">
+        <mc:Choice Requires="a14">
+          <p:sp>
+            <p:nvSpPr>
+              <p:cNvPr id="3" name="Segnaposto contenuto 2">
+                <a:extLst>
+                  <a:ext uri="{FF2B5EF4-FFF2-40B4-BE49-F238E27FC236}">
+                    <a16:creationId xmlns:a16="http://schemas.microsoft.com/office/drawing/2014/main" id="{B9F53D77-5544-41E6-8348-5265EDE4CAE1}"/>
+                  </a:ext>
+                </a:extLst>
+              </p:cNvPr>
+              <p:cNvSpPr>
+                <a:spLocks noGrp="1"/>
+              </p:cNvSpPr>
+              <p:nvPr>
+                <p:ph idx="1"/>
+              </p:nvPr>
+            </p:nvSpPr>
+            <p:spPr/>
+            <p:txBody>
+              <a:bodyPr>
+                <a:normAutofit fontScale="92500"/>
+              </a:bodyPr>
+              <a:lstStyle/>
+              <a:p>
+                <a:pPr marL="0" indent="0">
+                  <a:buNone/>
+                </a:pPr>
+                <a:r>
+                  <a:rPr lang="it-IT" i="1" dirty="0"/>
+                  <a:t>li</a:t>
+                </a:r>
+                <a:r>
+                  <a:rPr lang="it-IT" dirty="0"/>
+                  <a:t> = </a:t>
+                </a:r>
+                <a:r>
+                  <a:rPr lang="it-IT" dirty="0" err="1"/>
+                  <a:t>level</a:t>
+                </a:r>
+                <a:r>
+                  <a:rPr lang="it-IT" dirty="0"/>
+                  <a:t>(i) al round r, quando i deve prendere una decisione</a:t>
+                </a:r>
+              </a:p>
+              <a:p>
+                <a:pPr marL="0" indent="0">
+                  <a:buNone/>
+                </a:pPr>
+                <a:r>
+                  <a:rPr lang="it-IT" dirty="0"/>
+                  <a:t>Se </a:t>
+                </a:r>
+                <a14:m>
+                  <m:oMath xmlns:m="http://schemas.openxmlformats.org/officeDocument/2006/math">
+                    <m:r>
+                      <a:rPr lang="it-IT" i="1" dirty="0" smtClean="0">
+                        <a:latin typeface="Cambria Math" panose="02040503050406030204" pitchFamily="18" charset="0"/>
+                      </a:rPr>
+                      <m:t>𝑘𝑒𝑦</m:t>
+                    </m:r>
+                    <m:r>
+                      <a:rPr lang="it-IT" i="1" dirty="0" smtClean="0">
+                        <a:latin typeface="Cambria Math" panose="02040503050406030204" pitchFamily="18" charset="0"/>
+                      </a:rPr>
+                      <m:t> ≤ </m:t>
+                    </m:r>
+                    <m:r>
+                      <m:rPr>
+                        <m:sty m:val="p"/>
+                      </m:rPr>
+                      <a:rPr lang="it-IT" i="1" dirty="0" smtClean="0">
+                        <a:latin typeface="Cambria Math" panose="02040503050406030204" pitchFamily="18" charset="0"/>
+                      </a:rPr>
+                      <m:t>min</m:t>
+                    </m:r>
+                    <m:r>
+                      <a:rPr lang="it-IT" i="1" dirty="0" smtClean="0">
+                        <a:latin typeface="Cambria Math" panose="02040503050406030204" pitchFamily="18" charset="0"/>
+                      </a:rPr>
+                      <m:t>⁡{ </m:t>
+                    </m:r>
+                    <m:r>
+                      <a:rPr lang="it-IT" i="1" dirty="0" smtClean="0">
+                        <a:latin typeface="Cambria Math" panose="02040503050406030204" pitchFamily="18" charset="0"/>
+                      </a:rPr>
+                      <m:t>𝑙𝑖</m:t>
+                    </m:r>
+                    <m:r>
+                      <a:rPr lang="it-IT" i="1" dirty="0" smtClean="0">
+                        <a:latin typeface="Cambria Math" panose="02040503050406030204" pitchFamily="18" charset="0"/>
+                      </a:rPr>
+                      <m:t> } </m:t>
+                    </m:r>
+                  </m:oMath>
+                </a14:m>
+                <a:r>
+                  <a:rPr lang="it-IT" dirty="0"/>
+                  <a:t>tutti sono d’accordo </a:t>
+                </a:r>
+                <a:r>
+                  <a:rPr lang="it-IT" dirty="0" err="1"/>
+                  <a:t>perchè</a:t>
+                </a:r>
+                <a:r>
+                  <a:rPr lang="it-IT" dirty="0"/>
+                  <a:t> tutti hanno superato </a:t>
+                </a:r>
+                <a:r>
+                  <a:rPr lang="it-IT" i="1" dirty="0"/>
+                  <a:t>key, </a:t>
+                </a:r>
+                <a:r>
+                  <a:rPr lang="it-IT" dirty="0"/>
+                  <a:t>quindi ogni processo conosce le informazioni degli altri processi</a:t>
+                </a:r>
+                <a:endParaRPr lang="it-IT" i="1" dirty="0"/>
+              </a:p>
+              <a:p>
+                <a:pPr marL="0" indent="0">
+                  <a:buNone/>
+                </a:pPr>
+                <a:r>
+                  <a:rPr lang="it-IT" dirty="0"/>
+                  <a:t>Se invece </a:t>
+                </a:r>
+                <a14:m>
+                  <m:oMath xmlns:m="http://schemas.openxmlformats.org/officeDocument/2006/math">
+                    <m:r>
+                      <a:rPr lang="it-IT" i="1" dirty="0" smtClean="0">
+                        <a:latin typeface="Cambria Math" panose="02040503050406030204" pitchFamily="18" charset="0"/>
+                      </a:rPr>
+                      <m:t>𝑘𝑒𝑦</m:t>
+                    </m:r>
+                    <m:r>
+                      <a:rPr lang="it-IT" i="1" dirty="0" smtClean="0">
+                        <a:latin typeface="Cambria Math" panose="02040503050406030204" pitchFamily="18" charset="0"/>
+                      </a:rPr>
+                      <m:t> &gt; </m:t>
+                    </m:r>
+                    <m:r>
+                      <m:rPr>
+                        <m:sty m:val="p"/>
+                      </m:rPr>
+                      <a:rPr lang="it-IT" i="1" dirty="0" smtClean="0">
+                        <a:latin typeface="Cambria Math" panose="02040503050406030204" pitchFamily="18" charset="0"/>
+                      </a:rPr>
+                      <m:t>max</m:t>
+                    </m:r>
+                    <m:r>
+                      <a:rPr lang="it-IT" i="1" dirty="0" smtClean="0">
+                        <a:latin typeface="Cambria Math" panose="02040503050406030204" pitchFamily="18" charset="0"/>
+                      </a:rPr>
+                      <m:t>⁡{ </m:t>
+                    </m:r>
+                    <m:r>
+                      <a:rPr lang="it-IT" i="1" dirty="0" smtClean="0">
+                        <a:latin typeface="Cambria Math" panose="02040503050406030204" pitchFamily="18" charset="0"/>
+                      </a:rPr>
+                      <m:t>𝑙𝑖</m:t>
+                    </m:r>
+                    <m:r>
+                      <a:rPr lang="it-IT" i="1" dirty="0" smtClean="0">
+                        <a:latin typeface="Cambria Math" panose="02040503050406030204" pitchFamily="18" charset="0"/>
+                      </a:rPr>
+                      <m:t> } </m:t>
+                    </m:r>
+                  </m:oMath>
+                </a14:m>
+                <a:r>
+                  <a:rPr lang="it-IT" dirty="0"/>
+                  <a:t>si decide 0 </a:t>
+                </a:r>
+                <a:r>
+                  <a:rPr lang="it-IT" dirty="0" err="1"/>
+                  <a:t>perchè</a:t>
+                </a:r>
+                <a:r>
+                  <a:rPr lang="it-IT" dirty="0"/>
+                  <a:t> nessuno processo ha raggiunto il livello necessario.</a:t>
+                </a:r>
+              </a:p>
+              <a:p>
+                <a:pPr marL="0" indent="0">
+                  <a:buNone/>
+                </a:pPr>
+                <a:r>
+                  <a:rPr lang="it-IT" dirty="0"/>
+                  <a:t>L’unica situazione in cui i processi possono essere in disaccordo è quando </a:t>
+                </a:r>
+                <a14:m>
+                  <m:oMath xmlns:m="http://schemas.openxmlformats.org/officeDocument/2006/math">
+                    <m:r>
+                      <m:rPr>
+                        <m:sty m:val="p"/>
+                      </m:rPr>
+                      <a:rPr lang="it-IT" i="1" dirty="0" smtClean="0">
+                        <a:latin typeface="Cambria Math" panose="02040503050406030204" pitchFamily="18" charset="0"/>
+                      </a:rPr>
+                      <m:t>min</m:t>
+                    </m:r>
+                    <m:r>
+                      <a:rPr lang="it-IT" i="1" dirty="0" smtClean="0">
+                        <a:latin typeface="Cambria Math" panose="02040503050406030204" pitchFamily="18" charset="0"/>
+                      </a:rPr>
+                      <m:t>⁡{ </m:t>
+                    </m:r>
+                    <m:r>
+                      <a:rPr lang="it-IT" i="1" dirty="0" smtClean="0">
+                        <a:latin typeface="Cambria Math" panose="02040503050406030204" pitchFamily="18" charset="0"/>
+                      </a:rPr>
+                      <m:t>𝑙𝑖</m:t>
+                    </m:r>
+                    <m:r>
+                      <a:rPr lang="it-IT" i="1" dirty="0" smtClean="0">
+                        <a:latin typeface="Cambria Math" panose="02040503050406030204" pitchFamily="18" charset="0"/>
+                      </a:rPr>
+                      <m:t> } &lt; </m:t>
+                    </m:r>
+                    <m:r>
+                      <a:rPr lang="it-IT" i="1" dirty="0" smtClean="0">
+                        <a:latin typeface="Cambria Math" panose="02040503050406030204" pitchFamily="18" charset="0"/>
+                      </a:rPr>
+                      <m:t>𝑘𝑒𝑦</m:t>
+                    </m:r>
+                    <m:r>
+                      <a:rPr lang="it-IT" i="1" dirty="0" smtClean="0">
+                        <a:latin typeface="Cambria Math" panose="02040503050406030204" pitchFamily="18" charset="0"/>
+                      </a:rPr>
+                      <m:t> ≤ </m:t>
+                    </m:r>
+                    <m:r>
+                      <m:rPr>
+                        <m:sty m:val="p"/>
+                      </m:rPr>
+                      <a:rPr lang="it-IT" i="1" dirty="0" smtClean="0">
+                        <a:latin typeface="Cambria Math" panose="02040503050406030204" pitchFamily="18" charset="0"/>
+                      </a:rPr>
+                      <m:t>max</m:t>
+                    </m:r>
+                    <m:r>
+                      <a:rPr lang="it-IT" i="1" dirty="0" smtClean="0">
+                        <a:latin typeface="Cambria Math" panose="02040503050406030204" pitchFamily="18" charset="0"/>
+                      </a:rPr>
+                      <m:t>⁡{ </m:t>
+                    </m:r>
+                    <m:r>
+                      <a:rPr lang="it-IT" i="1" dirty="0" smtClean="0">
+                        <a:latin typeface="Cambria Math" panose="02040503050406030204" pitchFamily="18" charset="0"/>
+                      </a:rPr>
+                      <m:t>𝑙𝑖</m:t>
+                    </m:r>
+                    <m:r>
+                      <a:rPr lang="it-IT" i="1" dirty="0" smtClean="0">
+                        <a:latin typeface="Cambria Math" panose="02040503050406030204" pitchFamily="18" charset="0"/>
+                      </a:rPr>
+                      <m:t> } </m:t>
+                    </m:r>
+                  </m:oMath>
+                </a14:m>
+                <a:r>
+                  <a:rPr lang="it-IT" dirty="0"/>
+                  <a:t>cioè quando il valore di </a:t>
+                </a:r>
+                <a:r>
+                  <a:rPr lang="it-IT" dirty="0" err="1"/>
+                  <a:t>level</a:t>
+                </a:r>
+                <a:r>
+                  <a:rPr lang="it-IT" dirty="0"/>
+                  <a:t>(i) non è lo stesso per tutti i processi e key è più grande del valore più piccolo.</a:t>
+                </a:r>
+              </a:p>
+              <a:p>
+                <a:pPr marL="0" indent="0">
+                  <a:buNone/>
+                </a:pPr>
+                <a:r>
+                  <a:rPr lang="it-IT" dirty="0"/>
+                  <a:t>Ma i diversi </a:t>
+                </a:r>
+                <a:r>
+                  <a:rPr lang="it-IT" i="1" dirty="0"/>
+                  <a:t>li</a:t>
+                </a:r>
+                <a:r>
+                  <a:rPr lang="it-IT" dirty="0"/>
+                  <a:t> (uno per ogni nodo) si possono distaccare al massimo di 1 per quanto detto nel Lemma 5.2 quindi:</a:t>
+                </a:r>
+              </a:p>
+              <a:p>
+                <a:pPr marL="0" indent="0">
+                  <a:buNone/>
+                </a:pPr>
+                <a14:m>
+                  <m:oMath xmlns:m="http://schemas.openxmlformats.org/officeDocument/2006/math">
+                    <m:r>
+                      <a:rPr lang="it-IT" i="1" dirty="0" smtClean="0">
+                        <a:latin typeface="Cambria Math" panose="02040503050406030204" pitchFamily="18" charset="0"/>
+                      </a:rPr>
+                      <m:t>𝐷𝑖𝑟𝑒</m:t>
+                    </m:r>
+                    <m:r>
+                      <a:rPr lang="it-IT" i="1" dirty="0" smtClean="0">
+                        <a:latin typeface="Cambria Math" panose="02040503050406030204" pitchFamily="18" charset="0"/>
+                      </a:rPr>
+                      <m:t> </m:t>
+                    </m:r>
+                    <m:r>
+                      <m:rPr>
+                        <m:sty m:val="p"/>
+                      </m:rPr>
+                      <a:rPr lang="it-IT" i="1" dirty="0" smtClean="0">
+                        <a:latin typeface="Cambria Math" panose="02040503050406030204" pitchFamily="18" charset="0"/>
+                      </a:rPr>
+                      <m:t>min</m:t>
+                    </m:r>
+                    <m:r>
+                      <a:rPr lang="it-IT" i="1" dirty="0" smtClean="0">
+                        <a:latin typeface="Cambria Math" panose="02040503050406030204" pitchFamily="18" charset="0"/>
+                      </a:rPr>
+                      <m:t>⁡{ </m:t>
+                    </m:r>
+                    <m:r>
+                      <a:rPr lang="it-IT" i="1" dirty="0" smtClean="0">
+                        <a:latin typeface="Cambria Math" panose="02040503050406030204" pitchFamily="18" charset="0"/>
+                      </a:rPr>
+                      <m:t>𝑙𝑖</m:t>
+                    </m:r>
+                    <m:r>
+                      <a:rPr lang="it-IT" i="1" dirty="0" smtClean="0">
+                        <a:latin typeface="Cambria Math" panose="02040503050406030204" pitchFamily="18" charset="0"/>
+                      </a:rPr>
+                      <m:t> } &lt; </m:t>
+                    </m:r>
+                    <m:r>
+                      <a:rPr lang="it-IT" i="1" dirty="0" smtClean="0">
+                        <a:latin typeface="Cambria Math" panose="02040503050406030204" pitchFamily="18" charset="0"/>
+                      </a:rPr>
+                      <m:t>𝑘𝑒𝑦</m:t>
+                    </m:r>
+                    <m:r>
+                      <a:rPr lang="it-IT" i="1" dirty="0" smtClean="0">
+                        <a:latin typeface="Cambria Math" panose="02040503050406030204" pitchFamily="18" charset="0"/>
+                      </a:rPr>
+                      <m:t> ≤ </m:t>
+                    </m:r>
+                    <m:r>
+                      <m:rPr>
+                        <m:sty m:val="p"/>
+                      </m:rPr>
+                      <a:rPr lang="it-IT" i="1" dirty="0" smtClean="0">
+                        <a:latin typeface="Cambria Math" panose="02040503050406030204" pitchFamily="18" charset="0"/>
+                      </a:rPr>
+                      <m:t>max</m:t>
+                    </m:r>
+                    <m:r>
+                      <a:rPr lang="it-IT" i="1" dirty="0" smtClean="0">
+                        <a:latin typeface="Cambria Math" panose="02040503050406030204" pitchFamily="18" charset="0"/>
+                      </a:rPr>
+                      <m:t>⁡{ </m:t>
+                    </m:r>
+                    <m:r>
+                      <a:rPr lang="it-IT" i="1" dirty="0" smtClean="0">
+                        <a:latin typeface="Cambria Math" panose="02040503050406030204" pitchFamily="18" charset="0"/>
+                      </a:rPr>
+                      <m:t>𝑙𝑖</m:t>
+                    </m:r>
+                    <m:r>
+                      <a:rPr lang="it-IT" i="1" dirty="0" smtClean="0">
+                        <a:latin typeface="Cambria Math" panose="02040503050406030204" pitchFamily="18" charset="0"/>
+                      </a:rPr>
+                      <m:t> } </m:t>
+                    </m:r>
+                  </m:oMath>
+                </a14:m>
+                <a:r>
+                  <a:rPr lang="it-IT" dirty="0"/>
+                  <a:t>è come dire </a:t>
+                </a:r>
+                <a14:m>
+                  <m:oMath xmlns:m="http://schemas.openxmlformats.org/officeDocument/2006/math">
+                    <m:r>
+                      <a:rPr lang="it-IT" i="1" dirty="0" smtClean="0">
+                        <a:latin typeface="Cambria Math" panose="02040503050406030204" pitchFamily="18" charset="0"/>
+                      </a:rPr>
+                      <m:t>𝑘𝑒𝑦</m:t>
+                    </m:r>
+                    <m:r>
+                      <a:rPr lang="it-IT" i="1" dirty="0" smtClean="0">
+                        <a:latin typeface="Cambria Math" panose="02040503050406030204" pitchFamily="18" charset="0"/>
+                      </a:rPr>
+                      <m:t> =</m:t>
+                    </m:r>
+                    <m:func>
+                      <m:funcPr>
+                        <m:ctrlPr>
+                          <a:rPr lang="it-IT" i="1" dirty="0" smtClean="0">
+                            <a:latin typeface="Cambria Math" panose="02040503050406030204" pitchFamily="18" charset="0"/>
+                          </a:rPr>
+                        </m:ctrlPr>
+                      </m:funcPr>
+                      <m:fName>
+                        <m:r>
+                          <m:rPr>
+                            <m:sty m:val="p"/>
+                          </m:rPr>
+                          <a:rPr lang="it-IT" i="0" dirty="0" smtClean="0">
+                            <a:latin typeface="Cambria Math" panose="02040503050406030204" pitchFamily="18" charset="0"/>
+                          </a:rPr>
+                          <m:t>max</m:t>
+                        </m:r>
+                      </m:fName>
+                      <m:e>
+                        <m:d>
+                          <m:dPr>
+                            <m:begChr m:val="{"/>
+                            <m:endChr m:val="}"/>
+                            <m:ctrlPr>
+                              <a:rPr lang="it-IT" i="1" dirty="0" smtClean="0">
+                                <a:latin typeface="Cambria Math" panose="02040503050406030204" pitchFamily="18" charset="0"/>
+                              </a:rPr>
+                            </m:ctrlPr>
+                          </m:dPr>
+                          <m:e>
+                            <m:r>
+                              <a:rPr lang="it-IT" i="1" dirty="0" smtClean="0">
+                                <a:latin typeface="Cambria Math" panose="02040503050406030204" pitchFamily="18" charset="0"/>
+                              </a:rPr>
+                              <m:t> </m:t>
+                            </m:r>
+                            <m:r>
+                              <a:rPr lang="it-IT" i="1" dirty="0" smtClean="0">
+                                <a:latin typeface="Cambria Math" panose="02040503050406030204" pitchFamily="18" charset="0"/>
+                              </a:rPr>
+                              <m:t>𝑙𝑖</m:t>
+                            </m:r>
+                            <m:r>
+                              <a:rPr lang="it-IT" i="1" dirty="0" smtClean="0">
+                                <a:latin typeface="Cambria Math" panose="02040503050406030204" pitchFamily="18" charset="0"/>
+                              </a:rPr>
+                              <m:t> </m:t>
+                            </m:r>
+                          </m:e>
+                        </m:d>
+                      </m:e>
+                    </m:func>
+                    <m:r>
+                      <a:rPr lang="it-IT" i="1" dirty="0" smtClean="0">
+                        <a:latin typeface="Cambria Math" panose="02040503050406030204" pitchFamily="18" charset="0"/>
+                      </a:rPr>
+                      <m:t>. </m:t>
+                    </m:r>
+                  </m:oMath>
+                </a14:m>
+                <a:br>
+                  <a:rPr lang="it-IT" dirty="0"/>
+                </a:br>
+                <a:r>
+                  <a:rPr lang="it-IT" dirty="0"/>
+                  <a:t>Dato che </a:t>
+                </a:r>
+                <a:r>
+                  <a:rPr lang="it-IT" i="1" dirty="0"/>
+                  <a:t>key</a:t>
+                </a:r>
+                <a:r>
+                  <a:rPr lang="it-IT" dirty="0"/>
+                  <a:t> è un valore randomico tra 1 ed r la probabilità che ciò succeda è </a:t>
+                </a:r>
+                <a14:m>
+                  <m:oMath xmlns:m="http://schemas.openxmlformats.org/officeDocument/2006/math">
+                    <m:f>
+                      <m:fPr>
+                        <m:ctrlPr>
+                          <a:rPr lang="it-IT" i="1" dirty="0" smtClean="0">
+                            <a:latin typeface="Cambria Math" panose="02040503050406030204" pitchFamily="18" charset="0"/>
+                          </a:rPr>
+                        </m:ctrlPr>
+                      </m:fPr>
+                      <m:num>
+                        <m:r>
+                          <a:rPr lang="it-IT" b="0" i="1" dirty="0" smtClean="0">
+                            <a:latin typeface="Cambria Math" panose="02040503050406030204" pitchFamily="18" charset="0"/>
+                          </a:rPr>
+                          <m:t>1</m:t>
+                        </m:r>
+                      </m:num>
+                      <m:den>
+                        <m:r>
+                          <a:rPr lang="it-IT" b="0" i="1" dirty="0" smtClean="0">
+                            <a:latin typeface="Cambria Math" panose="02040503050406030204" pitchFamily="18" charset="0"/>
+                          </a:rPr>
+                          <m:t>𝑟</m:t>
+                        </m:r>
+                      </m:den>
+                    </m:f>
+                  </m:oMath>
+                </a14:m>
+                <a:endParaRPr lang="it-IT" dirty="0"/>
+              </a:p>
+              <a:p>
+                <a:endParaRPr lang="it-IT" dirty="0"/>
+              </a:p>
+            </p:txBody>
+          </p:sp>
+        </mc:Choice>
+        <mc:Fallback xmlns="">
+          <p:sp>
+            <p:nvSpPr>
+              <p:cNvPr id="3" name="Segnaposto contenuto 2">
+                <a:extLst>
+                  <a:ext uri="{FF2B5EF4-FFF2-40B4-BE49-F238E27FC236}">
+                    <a16:creationId xmlns:a16="http://schemas.microsoft.com/office/drawing/2014/main" id="{B9F53D77-5544-41E6-8348-5265EDE4CAE1}"/>
+                  </a:ext>
+                </a:extLst>
+              </p:cNvPr>
+              <p:cNvSpPr>
+                <a:spLocks noGrp="1" noRot="1" noChangeAspect="1" noMove="1" noResize="1" noEditPoints="1" noAdjustHandles="1" noChangeArrowheads="1" noChangeShapeType="1" noTextEdit="1"/>
+              </p:cNvSpPr>
+              <p:nvPr>
+                <p:ph idx="1"/>
+              </p:nvPr>
+            </p:nvSpPr>
+            <p:spPr>
+              <a:blipFill>
+                <a:blip r:embed="rId2"/>
+                <a:stretch>
+                  <a:fillRect l="-1455" t="-1515"/>
+                </a:stretch>
+              </a:blipFill>
+            </p:spPr>
+            <p:txBody>
+              <a:bodyPr/>
+              <a:lstStyle/>
+              <a:p>
+                <a:r>
+                  <a:rPr lang="it-IT">
+                    <a:noFill/>
+                  </a:rPr>
+                  <a:t> </a:t>
+                </a:r>
+              </a:p>
+            </p:txBody>
+          </p:sp>
+        </mc:Fallback>
+      </mc:AlternateContent>
     </p:spTree>
     <p:extLst>
       <p:ext uri="{BB962C8B-B14F-4D97-AF65-F5344CB8AC3E}">
@@ -30772,7 +31592,7 @@
 </p:sld>
 </file>
 
-<file path=ppt/slides/slide34.xml><?xml version="1.0" encoding="utf-8"?>
+<file path=ppt/slides/slide33.xml><?xml version="1.0" encoding="utf-8"?>
 <p:sld xmlns:a="http://schemas.openxmlformats.org/drawingml/2006/main" xmlns:r="http://schemas.openxmlformats.org/officeDocument/2006/relationships" xmlns:p="http://schemas.openxmlformats.org/presentationml/2006/main">
   <p:cSld>
     <p:spTree>
@@ -30822,8 +31642,8 @@
           </a:p>
         </p:txBody>
       </p:sp>
-      <mc:AlternateContent xmlns:mc="http://schemas.openxmlformats.org/markup-compatibility/2006" xmlns:a14="http://schemas.microsoft.com/office/drawing/2010/main">
-        <mc:Choice Requires="a14">
+      <mc:AlternateContent xmlns:mc="http://schemas.openxmlformats.org/markup-compatibility/2006">
+        <mc:Choice xmlns:a14="http://schemas.microsoft.com/office/drawing/2010/main" Requires="a14">
           <p:sp>
             <p:nvSpPr>
               <p:cNvPr id="4" name="Segnaposto contenuto 2">
@@ -31108,7 +31928,7 @@
               <a:p>
                 <a:pPr algn="ctr"/>
                 <a:r>
-                  <a:rPr lang="it-IT" sz="2400" i="1">
+                  <a:rPr lang="it-IT" sz="2400" i="1" dirty="0">
                     <a:solidFill>
                       <a:srgbClr val="404040"/>
                     </a:solidFill>
@@ -31120,6 +31940,18 @@
                 </a:r>
                 <a14:m>
                   <m:oMath xmlns:m="http://schemas.openxmlformats.org/officeDocument/2006/math">
+                    <m:r>
+                      <a:rPr lang="it-IT" sz="2400">
+                        <a:latin typeface="Cambria Math" panose="02040503050406030204" pitchFamily="18" charset="0"/>
+                      </a:rPr>
+                      <m:t>𝜖</m:t>
+                    </m:r>
+                    <m:r>
+                      <a:rPr lang="it-IT" sz="2400" b="0" i="1" smtClean="0">
+                        <a:latin typeface="Cambria Math" panose="02040503050406030204" pitchFamily="18" charset="0"/>
+                      </a:rPr>
+                      <m:t>=</m:t>
+                    </m:r>
                     <m:f>
                       <m:fPr>
                         <m:ctrlPr>
@@ -31173,7 +32005,7 @@
                     </m:f>
                   </m:oMath>
                 </a14:m>
-                <a:endParaRPr lang="it-IT" sz="2400">
+                <a:endParaRPr lang="it-IT" sz="2400" dirty="0">
                   <a:latin typeface="Calibri" panose="020F0502020204030204" pitchFamily="34" charset="0"/>
                   <a:ea typeface="Calibri" panose="020F0502020204030204" pitchFamily="34" charset="0"/>
                   <a:cs typeface="Times New Roman" panose="02020603050405020304" pitchFamily="18" charset="0"/>
@@ -31182,7 +32014,7 @@
             </p:txBody>
           </p:sp>
         </mc:Choice>
-        <mc:Fallback xmlns="">
+        <mc:Fallback>
           <p:sp>
             <p:nvSpPr>
               <p:cNvPr id="4" name="Segnaposto contenuto 2">
@@ -31248,8 +32080,8 @@
 </p:sld>
 </file>
 
-<file path=ppt/slides/slide35.xml><?xml version="1.0" encoding="utf-8"?>
-<p:sld xmlns:a="http://schemas.openxmlformats.org/drawingml/2006/main" xmlns:r="http://schemas.openxmlformats.org/officeDocument/2006/relationships" xmlns:p="http://schemas.openxmlformats.org/presentationml/2006/main">
+<file path=ppt/slides/slide34.xml><?xml version="1.0" encoding="utf-8"?>
+<p:sld xmlns:a="http://schemas.openxmlformats.org/drawingml/2006/main" xmlns:r="http://schemas.openxmlformats.org/officeDocument/2006/relationships" xmlns:p="http://schemas.openxmlformats.org/presentationml/2006/main" show="0">
   <p:cSld>
     <p:spTree>
       <p:nvGrpSpPr>
@@ -32050,8 +32882,8 @@
 </p:sld>
 </file>
 
-<file path=ppt/slides/slide36.xml><?xml version="1.0" encoding="utf-8"?>
-<p:sld xmlns:a="http://schemas.openxmlformats.org/drawingml/2006/main" xmlns:r="http://schemas.openxmlformats.org/officeDocument/2006/relationships" xmlns:p="http://schemas.openxmlformats.org/presentationml/2006/main">
+<file path=ppt/slides/slide35.xml><?xml version="1.0" encoding="utf-8"?>
+<p:sld xmlns:a="http://schemas.openxmlformats.org/drawingml/2006/main" xmlns:r="http://schemas.openxmlformats.org/officeDocument/2006/relationships" xmlns:p="http://schemas.openxmlformats.org/presentationml/2006/main" show="0">
   <p:cSld>
     <p:spTree>
       <p:nvGrpSpPr>
@@ -33951,8 +34783,8 @@
 </p:sld>
 </file>
 
-<file path=ppt/slides/slide37.xml><?xml version="1.0" encoding="utf-8"?>
-<p:sld xmlns:a="http://schemas.openxmlformats.org/drawingml/2006/main" xmlns:r="http://schemas.openxmlformats.org/officeDocument/2006/relationships" xmlns:p="http://schemas.openxmlformats.org/presentationml/2006/main">
+<file path=ppt/slides/slide36.xml><?xml version="1.0" encoding="utf-8"?>
+<p:sld xmlns:a="http://schemas.openxmlformats.org/drawingml/2006/main" xmlns:r="http://schemas.openxmlformats.org/officeDocument/2006/relationships" xmlns:p="http://schemas.openxmlformats.org/presentationml/2006/main" show="0">
   <p:cSld>
     <p:spTree>
       <p:nvGrpSpPr>
@@ -34389,7 +35221,7 @@
                     </m:oMath>
                   </m:oMathPara>
                 </a14:m>
-                <a:endParaRPr lang="it-IT" sz="2400">
+                <a:endParaRPr lang="it-IT" sz="2400" dirty="0">
                   <a:solidFill>
                     <a:schemeClr val="tx1">
                       <a:lumMod val="75000"/>
@@ -34908,7 +35740,7 @@
 </p:sld>
 </file>
 
-<file path=ppt/slides/slide38.xml><?xml version="1.0" encoding="utf-8"?>
+<file path=ppt/slides/slide37.xml><?xml version="1.0" encoding="utf-8"?>
 <p:sld xmlns:a="http://schemas.openxmlformats.org/drawingml/2006/main" xmlns:r="http://schemas.openxmlformats.org/officeDocument/2006/relationships" xmlns:p="http://schemas.openxmlformats.org/presentationml/2006/main">
   <p:cSld>
     <p:spTree>
@@ -35010,7 +35842,7 @@
 </p:sld>
 </file>
 
-<file path=ppt/slides/slide39.xml><?xml version="1.0" encoding="utf-8"?>
+<file path=ppt/slides/slide38.xml><?xml version="1.0" encoding="utf-8"?>
 <p:sld xmlns:a="http://schemas.openxmlformats.org/drawingml/2006/main" xmlns:r="http://schemas.openxmlformats.org/officeDocument/2006/relationships" xmlns:p="http://schemas.openxmlformats.org/presentationml/2006/main">
   <p:cSld>
     <p:spTree>

</xml_diff>